<commit_message>
Second half of slides
</commit_message>
<xml_diff>
--- a/slides/Wasm Interfaces and .NET.pptx
+++ b/slides/Wasm Interfaces and .NET.pptx
@@ -22,7 +22,18 @@
     <p:sldId id="283" r:id="rId16"/>
     <p:sldId id="284" r:id="rId17"/>
     <p:sldId id="285" r:id="rId18"/>
-    <p:sldId id="267" r:id="rId19"/>
+    <p:sldId id="286" r:id="rId19"/>
+    <p:sldId id="288" r:id="rId20"/>
+    <p:sldId id="289" r:id="rId21"/>
+    <p:sldId id="290" r:id="rId22"/>
+    <p:sldId id="291" r:id="rId23"/>
+    <p:sldId id="292" r:id="rId24"/>
+    <p:sldId id="293" r:id="rId25"/>
+    <p:sldId id="294" r:id="rId26"/>
+    <p:sldId id="295" r:id="rId27"/>
+    <p:sldId id="296" r:id="rId28"/>
+    <p:sldId id="297" r:id="rId29"/>
+    <p:sldId id="267" r:id="rId30"/>
   </p:sldIdLst>
   <p:sldSz cx="12192000" cy="6858000"/>
   <p:notesSz cx="6858000" cy="9144000"/>
@@ -266,7 +277,7 @@
           <a:p>
             <a:fld id="{846CE7D5-CF57-46EF-B807-FDD0502418D4}" type="datetimeFigureOut">
               <a:rPr lang="en-US" smtClean="0"/>
-              <a:t>10/17/2022</a:t>
+              <a:t>10/20/22</a:t>
             </a:fld>
             <a:endParaRPr lang="en-US"/>
           </a:p>
@@ -434,7 +445,7 @@
           <a:p>
             <a:fld id="{846CE7D5-CF57-46EF-B807-FDD0502418D4}" type="datetimeFigureOut">
               <a:rPr lang="en-US" smtClean="0"/>
-              <a:t>10/17/2022</a:t>
+              <a:t>10/20/22</a:t>
             </a:fld>
             <a:endParaRPr lang="en-US"/>
           </a:p>
@@ -612,7 +623,7 @@
           <a:p>
             <a:fld id="{846CE7D5-CF57-46EF-B807-FDD0502418D4}" type="datetimeFigureOut">
               <a:rPr lang="en-US" smtClean="0"/>
-              <a:t>10/17/2022</a:t>
+              <a:t>10/20/22</a:t>
             </a:fld>
             <a:endParaRPr lang="en-US"/>
           </a:p>
@@ -780,7 +791,7 @@
           <a:p>
             <a:fld id="{846CE7D5-CF57-46EF-B807-FDD0502418D4}" type="datetimeFigureOut">
               <a:rPr lang="en-US" smtClean="0"/>
-              <a:t>10/17/2022</a:t>
+              <a:t>10/20/22</a:t>
             </a:fld>
             <a:endParaRPr lang="en-US"/>
           </a:p>
@@ -1025,7 +1036,7 @@
           <a:p>
             <a:fld id="{846CE7D5-CF57-46EF-B807-FDD0502418D4}" type="datetimeFigureOut">
               <a:rPr lang="en-US" smtClean="0"/>
-              <a:t>10/17/2022</a:t>
+              <a:t>10/20/22</a:t>
             </a:fld>
             <a:endParaRPr lang="en-US"/>
           </a:p>
@@ -1254,7 +1265,7 @@
           <a:p>
             <a:fld id="{846CE7D5-CF57-46EF-B807-FDD0502418D4}" type="datetimeFigureOut">
               <a:rPr lang="en-US" smtClean="0"/>
-              <a:t>10/17/2022</a:t>
+              <a:t>10/20/22</a:t>
             </a:fld>
             <a:endParaRPr lang="en-US"/>
           </a:p>
@@ -1618,7 +1629,7 @@
           <a:p>
             <a:fld id="{846CE7D5-CF57-46EF-B807-FDD0502418D4}" type="datetimeFigureOut">
               <a:rPr lang="en-US" smtClean="0"/>
-              <a:t>10/17/2022</a:t>
+              <a:t>10/20/22</a:t>
             </a:fld>
             <a:endParaRPr lang="en-US"/>
           </a:p>
@@ -1735,7 +1746,7 @@
           <a:p>
             <a:fld id="{846CE7D5-CF57-46EF-B807-FDD0502418D4}" type="datetimeFigureOut">
               <a:rPr lang="en-US" smtClean="0"/>
-              <a:t>10/17/2022</a:t>
+              <a:t>10/20/22</a:t>
             </a:fld>
             <a:endParaRPr lang="en-US"/>
           </a:p>
@@ -1830,7 +1841,7 @@
           <a:p>
             <a:fld id="{846CE7D5-CF57-46EF-B807-FDD0502418D4}" type="datetimeFigureOut">
               <a:rPr lang="en-US" smtClean="0"/>
-              <a:t>10/17/2022</a:t>
+              <a:t>10/20/22</a:t>
             </a:fld>
             <a:endParaRPr lang="en-US"/>
           </a:p>
@@ -2105,7 +2116,7 @@
           <a:p>
             <a:fld id="{846CE7D5-CF57-46EF-B807-FDD0502418D4}" type="datetimeFigureOut">
               <a:rPr lang="en-US" smtClean="0"/>
-              <a:t>10/17/2022</a:t>
+              <a:t>10/20/22</a:t>
             </a:fld>
             <a:endParaRPr lang="en-US"/>
           </a:p>
@@ -2360,7 +2371,7 @@
           <a:p>
             <a:fld id="{846CE7D5-CF57-46EF-B807-FDD0502418D4}" type="datetimeFigureOut">
               <a:rPr lang="en-US" smtClean="0"/>
-              <a:t>10/17/2022</a:t>
+              <a:t>10/20/22</a:t>
             </a:fld>
             <a:endParaRPr lang="en-US"/>
           </a:p>
@@ -2571,7 +2582,7 @@
           <a:p>
             <a:fld id="{846CE7D5-CF57-46EF-B807-FDD0502418D4}" type="datetimeFigureOut">
               <a:rPr lang="en-US" smtClean="0"/>
-              <a:t>10/17/2022</a:t>
+              <a:t>10/20/22</a:t>
             </a:fld>
             <a:endParaRPr lang="en-US"/>
           </a:p>
@@ -8286,10 +8297,10 @@
       </p:grpSpPr>
       <p:pic>
         <p:nvPicPr>
-          <p:cNvPr id="7" name="Picture 15" descr="Icon&#10;&#10;Description automatically generated">
-            <a:extLst>
-              <a:ext uri="{FF2B5EF4-FFF2-40B4-BE49-F238E27FC236}">
-                <a16:creationId xmlns:a16="http://schemas.microsoft.com/office/drawing/2014/main" id="{2E17E816-50B0-B06E-F42B-4E02E55CBF7F}"/>
+          <p:cNvPr id="15" name="Picture 15" descr="Icon&#10;&#10;Description automatically generated">
+            <a:extLst>
+              <a:ext uri="{FF2B5EF4-FFF2-40B4-BE49-F238E27FC236}">
+                <a16:creationId xmlns:a16="http://schemas.microsoft.com/office/drawing/2014/main" id="{D8D6748C-0585-41A5-8CF9-038CF8AE4A95}"/>
               </a:ext>
             </a:extLst>
           </p:cNvPr>
@@ -8316,10 +8327,10 @@
       </p:pic>
       <p:sp>
         <p:nvSpPr>
-          <p:cNvPr id="2" name="Title 1">
-            <a:extLst>
-              <a:ext uri="{FF2B5EF4-FFF2-40B4-BE49-F238E27FC236}">
-                <a16:creationId xmlns:a16="http://schemas.microsoft.com/office/drawing/2014/main" id="{F7C4B072-298F-4A0B-88F9-58043C04C538}"/>
+          <p:cNvPr id="8" name="Title 1">
+            <a:extLst>
+              <a:ext uri="{FF2B5EF4-FFF2-40B4-BE49-F238E27FC236}">
+                <a16:creationId xmlns:a16="http://schemas.microsoft.com/office/drawing/2014/main" id="{1F5EBDF9-E3E1-9410-7F69-108A2215720D}"/>
               </a:ext>
             </a:extLst>
           </p:cNvPr>
@@ -8332,7 +8343,7 @@
         </p:nvSpPr>
         <p:spPr>
           <a:xfrm>
-            <a:off x="323850" y="365125"/>
+            <a:off x="323850" y="1946275"/>
             <a:ext cx="11481184" cy="1325563"/>
           </a:xfrm>
         </p:spPr>
@@ -8351,17 +8362,17 @@
                 <a:latin typeface="+mn-lt"/>
                 <a:cs typeface="Calibri Light"/>
               </a:rPr>
-              <a:t>thanks!</a:t>
-            </a:r>
-          </a:p>
-        </p:txBody>
-      </p:sp>
-      <p:sp>
-        <p:nvSpPr>
-          <p:cNvPr id="3" name="Content Placeholder 2">
-            <a:extLst>
-              <a:ext uri="{FF2B5EF4-FFF2-40B4-BE49-F238E27FC236}">
-                <a16:creationId xmlns:a16="http://schemas.microsoft.com/office/drawing/2014/main" id="{81C248F1-35F2-41D9-A7BD-E53E926F00C0}"/>
+              <a:t>but</a:t>
+            </a:r>
+          </a:p>
+        </p:txBody>
+      </p:sp>
+      <p:sp>
+        <p:nvSpPr>
+          <p:cNvPr id="9" name="Content Placeholder 2">
+            <a:extLst>
+              <a:ext uri="{FF2B5EF4-FFF2-40B4-BE49-F238E27FC236}">
+                <a16:creationId xmlns:a16="http://schemas.microsoft.com/office/drawing/2014/main" id="{628DDC8C-D4B6-334B-DAAE-F14F9D367722}"/>
               </a:ext>
             </a:extLst>
           </p:cNvPr>
@@ -8374,8 +8385,8 @@
         </p:nvSpPr>
         <p:spPr>
           <a:xfrm>
-            <a:off x="323850" y="1883603"/>
-            <a:ext cx="11481184" cy="3692249"/>
+            <a:off x="323850" y="3314700"/>
+            <a:ext cx="11481184" cy="2261152"/>
           </a:xfrm>
         </p:spPr>
         <p:txBody>
@@ -8387,34 +8398,7 @@
             <a:pPr marL="0" indent="0" algn="ctr">
               <a:buNone/>
             </a:pPr>
-            <a:r>
-              <a:rPr lang="en-US" dirty="0">
-                <a:solidFill>
-                  <a:srgbClr val="0D203F"/>
-                </a:solidFill>
-                <a:ea typeface="+mn-lt"/>
-                <a:cs typeface="+mn-lt"/>
-                <a:hlinkClick r:id="rId3"/>
-              </a:rPr>
-              <a:t>https://github.com/itowlson/wasmday22</a:t>
-            </a:r>
-          </a:p>
-          <a:p>
-            <a:pPr marL="0" indent="0" algn="ctr">
-              <a:buNone/>
-            </a:pPr>
-            <a:r>
-              <a:rPr lang="en-US" dirty="0">
-                <a:solidFill>
-                  <a:srgbClr val="0D203F"/>
-                </a:solidFill>
-                <a:ea typeface="+mn-lt"/>
-                <a:cs typeface="+mn-lt"/>
-                <a:hlinkClick r:id="rId3"/>
-              </a:rPr>
-              <a:t>https://github.com/fermyon/spin-dotnet-sdk</a:t>
-            </a:r>
-            <a:endParaRPr lang="en-US" dirty="0">
+            <a:endParaRPr lang="en-US" sz="3200" dirty="0">
               <a:solidFill>
                 <a:srgbClr val="0D203F"/>
               </a:solidFill>
@@ -8422,74 +8406,655 @@
               <a:cs typeface="+mn-lt"/>
             </a:endParaRPr>
           </a:p>
-          <a:p>
-            <a:pPr marL="0" indent="0" algn="ctr">
+        </p:txBody>
+      </p:sp>
+    </p:spTree>
+    <p:extLst>
+      <p:ext uri="{BB962C8B-B14F-4D97-AF65-F5344CB8AC3E}">
+        <p14:creationId xmlns:p14="http://schemas.microsoft.com/office/powerpoint/2010/main" val="85962604"/>
+      </p:ext>
+    </p:extLst>
+  </p:cSld>
+  <p:clrMapOvr>
+    <a:masterClrMapping/>
+  </p:clrMapOvr>
+  <p:transition spd="med">
+    <p:fade/>
+  </p:transition>
+</p:sld>
+</file>
+
+<file path=ppt/slides/slide19.xml><?xml version="1.0" encoding="utf-8"?>
+<p:sld xmlns:a="http://schemas.openxmlformats.org/drawingml/2006/main" xmlns:r="http://schemas.openxmlformats.org/officeDocument/2006/relationships" xmlns:p="http://schemas.openxmlformats.org/presentationml/2006/main">
+  <p:cSld>
+    <p:bg>
+      <p:bgPr>
+        <a:solidFill>
+          <a:srgbClr val="ECE5EE"/>
+        </a:solidFill>
+        <a:effectLst/>
+      </p:bgPr>
+    </p:bg>
+    <p:spTree>
+      <p:nvGrpSpPr>
+        <p:cNvPr id="1" name=""/>
+        <p:cNvGrpSpPr/>
+        <p:nvPr/>
+      </p:nvGrpSpPr>
+      <p:grpSpPr>
+        <a:xfrm>
+          <a:off x="0" y="0"/>
+          <a:ext cx="0" cy="0"/>
+          <a:chOff x="0" y="0"/>
+          <a:chExt cx="0" cy="0"/>
+        </a:xfrm>
+      </p:grpSpPr>
+      <p:pic>
+        <p:nvPicPr>
+          <p:cNvPr id="15" name="Picture 15" descr="Icon&#10;&#10;Description automatically generated">
+            <a:extLst>
+              <a:ext uri="{FF2B5EF4-FFF2-40B4-BE49-F238E27FC236}">
+                <a16:creationId xmlns:a16="http://schemas.microsoft.com/office/drawing/2014/main" id="{D8D6748C-0585-41A5-8CF9-038CF8AE4A95}"/>
+              </a:ext>
+            </a:extLst>
+          </p:cNvPr>
+          <p:cNvPicPr>
+            <a:picLocks noChangeAspect="1"/>
+          </p:cNvPicPr>
+          <p:nvPr/>
+        </p:nvPicPr>
+        <p:blipFill>
+          <a:blip r:embed="rId2"/>
+          <a:stretch>
+            <a:fillRect/>
+          </a:stretch>
+        </p:blipFill>
+        <p:spPr>
+          <a:xfrm>
+            <a:off x="10767011" y="5454852"/>
+            <a:ext cx="1039620" cy="1039665"/>
+          </a:xfrm>
+          <a:prstGeom prst="rect">
+            <a:avLst/>
+          </a:prstGeom>
+        </p:spPr>
+      </p:pic>
+      <p:sp>
+        <p:nvSpPr>
+          <p:cNvPr id="16" name="Title 1">
+            <a:extLst>
+              <a:ext uri="{FF2B5EF4-FFF2-40B4-BE49-F238E27FC236}">
+                <a16:creationId xmlns:a16="http://schemas.microsoft.com/office/drawing/2014/main" id="{11CD93ED-E289-E8A9-3270-139C577567E3}"/>
+              </a:ext>
+            </a:extLst>
+          </p:cNvPr>
+          <p:cNvSpPr txBox="1">
+            <a:spLocks/>
+          </p:cNvSpPr>
+          <p:nvPr/>
+        </p:nvSpPr>
+        <p:spPr>
+          <a:xfrm>
+            <a:off x="355408" y="746749"/>
+            <a:ext cx="11481184" cy="883123"/>
+          </a:xfrm>
+          <a:prstGeom prst="rect">
+            <a:avLst/>
+          </a:prstGeom>
+        </p:spPr>
+        <p:txBody>
+          <a:bodyPr vert="horz" lIns="91440" tIns="45720" rIns="91440" bIns="45720" rtlCol="0" anchor="ctr">
+            <a:normAutofit/>
+          </a:bodyPr>
+          <a:lstStyle>
+            <a:lvl1pPr algn="l" defTabSz="914400" rtl="0" eaLnBrk="1" latinLnBrk="0" hangingPunct="1">
+              <a:lnSpc>
+                <a:spcPct val="90000"/>
+              </a:lnSpc>
+              <a:spcBef>
+                <a:spcPct val="0"/>
+              </a:spcBef>
               <a:buNone/>
-            </a:pPr>
-            <a:r>
-              <a:rPr lang="en-US" dirty="0">
+              <a:defRPr sz="4400" kern="1200">
+                <a:solidFill>
+                  <a:schemeClr val="tx1"/>
+                </a:solidFill>
+                <a:latin typeface="+mj-lt"/>
+                <a:ea typeface="+mj-ea"/>
+                <a:cs typeface="+mj-cs"/>
+              </a:defRPr>
+            </a:lvl1pPr>
+          </a:lstStyle>
+          <a:p>
+            <a:pPr algn="ctr"/>
+            <a:r>
+              <a:rPr lang="en-US" sz="4000" b="1" dirty="0">
                 <a:solidFill>
                   <a:srgbClr val="0D203F"/>
                 </a:solidFill>
-                <a:ea typeface="+mn-lt"/>
-                <a:cs typeface="+mn-lt"/>
-                <a:hlinkClick r:id="rId4"/>
+                <a:latin typeface="+mn-lt"/>
+                <a:cs typeface="Calibri Light"/>
               </a:rPr>
-              <a:t>https://github.com/SteveSandersonMS/dotnet-wasi-sdk</a:t>
-            </a:r>
-            <a:endParaRPr lang="en-US" dirty="0">
+              <a:t>inside: </a:t>
+            </a:r>
+            <a:r>
+              <a:rPr lang="en-US" sz="4000" b="1" dirty="0" err="1">
+                <a:solidFill>
+                  <a:srgbClr val="0D203F"/>
+                </a:solidFill>
+                <a:latin typeface="+mn-lt"/>
+                <a:cs typeface="Calibri Light"/>
+              </a:rPr>
+              <a:t>wasi</a:t>
+            </a:r>
+            <a:endParaRPr lang="en-US" sz="4000" b="1" dirty="0">
               <a:solidFill>
                 <a:srgbClr val="0D203F"/>
               </a:solidFill>
-              <a:ea typeface="+mn-lt"/>
-              <a:cs typeface="+mn-lt"/>
+              <a:latin typeface="+mn-lt"/>
+              <a:cs typeface="Calibri Light"/>
             </a:endParaRPr>
           </a:p>
-          <a:p>
-            <a:pPr marL="0" indent="0" algn="ctr">
-              <a:buNone/>
-            </a:pPr>
-            <a:endParaRPr lang="en-US" dirty="0">
-              <a:solidFill>
-                <a:srgbClr val="0D203F"/>
-              </a:solidFill>
-              <a:ea typeface="+mn-lt"/>
-              <a:cs typeface="+mn-lt"/>
-            </a:endParaRPr>
-          </a:p>
-          <a:p>
-            <a:pPr marL="0" indent="0" algn="ctr">
-              <a:buNone/>
-            </a:pPr>
-            <a:r>
-              <a:rPr lang="en-US" dirty="0">
-                <a:solidFill>
-                  <a:srgbClr val="0D203F"/>
-                </a:solidFill>
-                <a:ea typeface="+mn-lt"/>
-                <a:cs typeface="+mn-lt"/>
-              </a:rPr>
-              <a:t>ivan.towlson@fermyon.com | @ppog_penguin</a:t>
-            </a:r>
-          </a:p>
-          <a:p>
-            <a:pPr marL="0" indent="0" algn="ctr">
-              <a:buNone/>
-            </a:pPr>
-            <a:endParaRPr lang="en-US" dirty="0">
-              <a:solidFill>
-                <a:srgbClr val="0D203F"/>
-              </a:solidFill>
-              <a:ea typeface="+mn-lt"/>
-              <a:cs typeface="+mn-lt"/>
-            </a:endParaRPr>
+        </p:txBody>
+      </p:sp>
+      <p:sp>
+        <p:nvSpPr>
+          <p:cNvPr id="2" name="Rectangle: Rounded Corners 1">
+            <a:extLst>
+              <a:ext uri="{FF2B5EF4-FFF2-40B4-BE49-F238E27FC236}">
+                <a16:creationId xmlns:a16="http://schemas.microsoft.com/office/drawing/2014/main" id="{84E71B34-6FAE-76A1-ADD6-6197C0B72B27}"/>
+              </a:ext>
+            </a:extLst>
+          </p:cNvPr>
+          <p:cNvSpPr/>
+          <p:nvPr/>
+        </p:nvSpPr>
+        <p:spPr>
+          <a:xfrm>
+            <a:off x="6059940" y="2281703"/>
+            <a:ext cx="1568422" cy="1769597"/>
+          </a:xfrm>
+          <a:prstGeom prst="roundRect">
+            <a:avLst/>
+          </a:prstGeom>
+          <a:solidFill>
+            <a:schemeClr val="accent2"/>
+          </a:solidFill>
+          <a:effectLst>
+            <a:outerShdw blurRad="50800" dist="38100" dir="2700000" algn="tl" rotWithShape="0">
+              <a:prstClr val="black">
+                <a:alpha val="40000"/>
+              </a:prstClr>
+            </a:outerShdw>
+          </a:effectLst>
+        </p:spPr>
+        <p:style>
+          <a:lnRef idx="2">
+            <a:schemeClr val="accent1">
+              <a:shade val="50000"/>
+            </a:schemeClr>
+          </a:lnRef>
+          <a:fillRef idx="1">
+            <a:schemeClr val="accent1"/>
+          </a:fillRef>
+          <a:effectRef idx="0">
+            <a:schemeClr val="accent1"/>
+          </a:effectRef>
+          <a:fontRef idx="minor">
+            <a:schemeClr val="lt1"/>
+          </a:fontRef>
+        </p:style>
+        <p:txBody>
+          <a:bodyPr rtlCol="0" anchor="ctr"/>
+          <a:lstStyle/>
+          <a:p>
+            <a:pPr algn="ctr"/>
+            <a:r>
+              <a:rPr lang="en-NZ" sz="2400" b="1" dirty="0"/>
+              <a:t>Mono VES</a:t>
+            </a:r>
+          </a:p>
+          <a:p>
+            <a:pPr algn="ctr"/>
+            <a:r>
+              <a:rPr lang="en-NZ" dirty="0"/>
+              <a:t>(C compiled to </a:t>
+            </a:r>
+            <a:r>
+              <a:rPr lang="en-NZ" dirty="0" err="1"/>
+              <a:t>Wasm</a:t>
+            </a:r>
+            <a:r>
+              <a:rPr lang="en-NZ" dirty="0"/>
+              <a:t>)</a:t>
+            </a:r>
+          </a:p>
+        </p:txBody>
+      </p:sp>
+      <p:sp>
+        <p:nvSpPr>
+          <p:cNvPr id="4" name="Rectangle: Rounded Corners 3">
+            <a:extLst>
+              <a:ext uri="{FF2B5EF4-FFF2-40B4-BE49-F238E27FC236}">
+                <a16:creationId xmlns:a16="http://schemas.microsoft.com/office/drawing/2014/main" id="{316002EF-3F4E-8990-C676-446D6AAFEBFF}"/>
+              </a:ext>
+            </a:extLst>
+          </p:cNvPr>
+          <p:cNvSpPr/>
+          <p:nvPr/>
+        </p:nvSpPr>
+        <p:spPr>
+          <a:xfrm>
+            <a:off x="7792230" y="2464861"/>
+            <a:ext cx="1568422" cy="1459439"/>
+          </a:xfrm>
+          <a:prstGeom prst="roundRect">
+            <a:avLst/>
+          </a:prstGeom>
+          <a:effectLst>
+            <a:outerShdw blurRad="50800" dist="38100" dir="2700000" algn="tl" rotWithShape="0">
+              <a:prstClr val="black">
+                <a:alpha val="40000"/>
+              </a:prstClr>
+            </a:outerShdw>
+          </a:effectLst>
+        </p:spPr>
+        <p:style>
+          <a:lnRef idx="2">
+            <a:schemeClr val="accent1">
+              <a:shade val="50000"/>
+            </a:schemeClr>
+          </a:lnRef>
+          <a:fillRef idx="1">
+            <a:schemeClr val="accent1"/>
+          </a:fillRef>
+          <a:effectRef idx="0">
+            <a:schemeClr val="accent1"/>
+          </a:effectRef>
+          <a:fontRef idx="minor">
+            <a:schemeClr val="lt1"/>
+          </a:fontRef>
+        </p:style>
+        <p:txBody>
+          <a:bodyPr rtlCol="0" anchor="ctr"/>
+          <a:lstStyle/>
+          <a:p>
+            <a:pPr algn="ctr"/>
+            <a:r>
+              <a:rPr lang="en-NZ" sz="2400" b="1" dirty="0"/>
+              <a:t>User Main()</a:t>
+            </a:r>
+          </a:p>
+          <a:p>
+            <a:pPr algn="ctr"/>
+            <a:r>
+              <a:rPr lang="en-NZ" dirty="0"/>
+              <a:t>(IL)</a:t>
+            </a:r>
+          </a:p>
+        </p:txBody>
+      </p:sp>
+      <p:sp>
+        <p:nvSpPr>
+          <p:cNvPr id="7" name="Rectangle: Rounded Corners 6">
+            <a:extLst>
+              <a:ext uri="{FF2B5EF4-FFF2-40B4-BE49-F238E27FC236}">
+                <a16:creationId xmlns:a16="http://schemas.microsoft.com/office/drawing/2014/main" id="{8D4B1432-FA00-0997-9B5D-0B6BF4AC68B2}"/>
+              </a:ext>
+            </a:extLst>
+          </p:cNvPr>
+          <p:cNvSpPr/>
+          <p:nvPr/>
+        </p:nvSpPr>
+        <p:spPr>
+          <a:xfrm>
+            <a:off x="2831348" y="1946274"/>
+            <a:ext cx="1450428" cy="4289426"/>
+          </a:xfrm>
+          <a:prstGeom prst="roundRect">
+            <a:avLst/>
+          </a:prstGeom>
+          <a:solidFill>
+            <a:schemeClr val="accent2"/>
+          </a:solidFill>
+          <a:effectLst>
+            <a:outerShdw blurRad="50800" dist="38100" dir="2700000" algn="tl" rotWithShape="0">
+              <a:prstClr val="black">
+                <a:alpha val="40000"/>
+              </a:prstClr>
+            </a:outerShdw>
+          </a:effectLst>
+        </p:spPr>
+        <p:style>
+          <a:lnRef idx="2">
+            <a:schemeClr val="accent1">
+              <a:shade val="50000"/>
+            </a:schemeClr>
+          </a:lnRef>
+          <a:fillRef idx="1">
+            <a:schemeClr val="accent1"/>
+          </a:fillRef>
+          <a:effectRef idx="0">
+            <a:schemeClr val="accent1"/>
+          </a:effectRef>
+          <a:fontRef idx="minor">
+            <a:schemeClr val="lt1"/>
+          </a:fontRef>
+        </p:style>
+        <p:txBody>
+          <a:bodyPr tIns="864000" rtlCol="0" anchor="t" anchorCtr="0"/>
+          <a:lstStyle/>
+          <a:p>
+            <a:pPr algn="ctr"/>
+            <a:r>
+              <a:rPr lang="en-NZ" sz="2400" b="1" dirty="0"/>
+              <a:t>Host</a:t>
+            </a:r>
+          </a:p>
+        </p:txBody>
+      </p:sp>
+      <p:sp>
+        <p:nvSpPr>
+          <p:cNvPr id="19" name="Rectangle: Rounded Corners 6">
+            <a:extLst>
+              <a:ext uri="{FF2B5EF4-FFF2-40B4-BE49-F238E27FC236}">
+                <a16:creationId xmlns:a16="http://schemas.microsoft.com/office/drawing/2014/main" id="{C9E444C5-15D8-BEBD-3A02-7B4C46296033}"/>
+              </a:ext>
+            </a:extLst>
+          </p:cNvPr>
+          <p:cNvSpPr/>
+          <p:nvPr/>
+        </p:nvSpPr>
+        <p:spPr>
+          <a:xfrm>
+            <a:off x="4445644" y="2105691"/>
+            <a:ext cx="1450428" cy="2059909"/>
+          </a:xfrm>
+          <a:prstGeom prst="roundRect">
+            <a:avLst/>
+          </a:prstGeom>
+          <a:solidFill>
+            <a:schemeClr val="accent2"/>
+          </a:solidFill>
+          <a:effectLst>
+            <a:outerShdw blurRad="50800" dist="38100" dir="2700000" algn="tl" rotWithShape="0">
+              <a:prstClr val="black">
+                <a:alpha val="40000"/>
+              </a:prstClr>
+            </a:outerShdw>
+          </a:effectLst>
+        </p:spPr>
+        <p:style>
+          <a:lnRef idx="2">
+            <a:schemeClr val="accent1">
+              <a:shade val="50000"/>
+            </a:schemeClr>
+          </a:lnRef>
+          <a:fillRef idx="1">
+            <a:schemeClr val="accent1"/>
+          </a:fillRef>
+          <a:effectRef idx="0">
+            <a:schemeClr val="accent1"/>
+          </a:effectRef>
+          <a:fontRef idx="minor">
+            <a:schemeClr val="lt1"/>
+          </a:fontRef>
+        </p:style>
+        <p:txBody>
+          <a:bodyPr rtlCol="0" anchor="ctr"/>
+          <a:lstStyle/>
+          <a:p>
+            <a:pPr algn="ctr"/>
+            <a:r>
+              <a:rPr lang="en-NZ" sz="2400" b="1" dirty="0"/>
+              <a:t>_start</a:t>
+            </a:r>
+          </a:p>
+          <a:p>
+            <a:pPr algn="ctr"/>
+            <a:r>
+              <a:rPr lang="en-NZ" dirty="0"/>
+              <a:t>(</a:t>
+            </a:r>
+            <a:r>
+              <a:rPr lang="en-NZ" dirty="0" err="1"/>
+              <a:t>Wasi.Sdk</a:t>
+            </a:r>
+            <a:r>
+              <a:rPr lang="en-NZ" dirty="0"/>
+              <a:t> C compiled to </a:t>
+            </a:r>
+            <a:r>
+              <a:rPr lang="en-NZ" dirty="0" err="1"/>
+              <a:t>Wasm</a:t>
+            </a:r>
+            <a:r>
+              <a:rPr lang="en-NZ" dirty="0"/>
+              <a:t>)</a:t>
+            </a:r>
+          </a:p>
+        </p:txBody>
+      </p:sp>
+      <p:sp>
+        <p:nvSpPr>
+          <p:cNvPr id="22" name="Rectangle: Rounded Corners 3">
+            <a:extLst>
+              <a:ext uri="{FF2B5EF4-FFF2-40B4-BE49-F238E27FC236}">
+                <a16:creationId xmlns:a16="http://schemas.microsoft.com/office/drawing/2014/main" id="{30AB942A-841C-03C8-6110-82B95554BCCB}"/>
+              </a:ext>
+            </a:extLst>
+          </p:cNvPr>
+          <p:cNvSpPr/>
+          <p:nvPr/>
+        </p:nvSpPr>
+        <p:spPr>
+          <a:xfrm>
+            <a:off x="7792230" y="5159266"/>
+            <a:ext cx="1568422" cy="903889"/>
+          </a:xfrm>
+          <a:prstGeom prst="roundRect">
+            <a:avLst/>
+          </a:prstGeom>
+          <a:effectLst>
+            <a:outerShdw blurRad="50800" dist="38100" dir="2700000" algn="tl" rotWithShape="0">
+              <a:prstClr val="black">
+                <a:alpha val="40000"/>
+              </a:prstClr>
+            </a:outerShdw>
+          </a:effectLst>
+        </p:spPr>
+        <p:style>
+          <a:lnRef idx="2">
+            <a:schemeClr val="accent1">
+              <a:shade val="50000"/>
+            </a:schemeClr>
+          </a:lnRef>
+          <a:fillRef idx="1">
+            <a:schemeClr val="accent1"/>
+          </a:fillRef>
+          <a:effectRef idx="0">
+            <a:schemeClr val="accent1"/>
+          </a:effectRef>
+          <a:fontRef idx="minor">
+            <a:schemeClr val="lt1"/>
+          </a:fontRef>
+        </p:style>
+        <p:txBody>
+          <a:bodyPr rtlCol="0" anchor="ctr"/>
+          <a:lstStyle/>
+          <a:p>
+            <a:pPr algn="ctr"/>
+            <a:r>
+              <a:rPr lang="en-NZ" sz="2400" b="1" dirty="0"/>
+              <a:t>BCL</a:t>
+            </a:r>
+          </a:p>
+          <a:p>
+            <a:pPr algn="ctr"/>
+            <a:r>
+              <a:rPr lang="en-NZ" dirty="0"/>
+              <a:t>(IL)</a:t>
+            </a:r>
+          </a:p>
+        </p:txBody>
+      </p:sp>
+      <p:sp>
+        <p:nvSpPr>
+          <p:cNvPr id="23" name="Rounded Rectangle 22">
+            <a:extLst>
+              <a:ext uri="{FF2B5EF4-FFF2-40B4-BE49-F238E27FC236}">
+                <a16:creationId xmlns:a16="http://schemas.microsoft.com/office/drawing/2014/main" id="{67657268-8594-58EC-5277-9A165FEE4016}"/>
+              </a:ext>
+            </a:extLst>
+          </p:cNvPr>
+          <p:cNvSpPr/>
+          <p:nvPr/>
+        </p:nvSpPr>
+        <p:spPr>
+          <a:xfrm>
+            <a:off x="2963917" y="5159266"/>
+            <a:ext cx="1177159" cy="903889"/>
+          </a:xfrm>
+          <a:prstGeom prst="roundRect">
+            <a:avLst/>
+          </a:prstGeom>
+        </p:spPr>
+        <p:style>
+          <a:lnRef idx="2">
+            <a:schemeClr val="accent1">
+              <a:shade val="50000"/>
+            </a:schemeClr>
+          </a:lnRef>
+          <a:fillRef idx="1">
+            <a:schemeClr val="accent1"/>
+          </a:fillRef>
+          <a:effectRef idx="0">
+            <a:schemeClr val="accent1"/>
+          </a:effectRef>
+          <a:fontRef idx="minor">
+            <a:schemeClr val="lt1"/>
+          </a:fontRef>
+        </p:style>
+        <p:txBody>
+          <a:bodyPr rtlCol="0" anchor="ctr"/>
+          <a:lstStyle/>
+          <a:p>
+            <a:pPr algn="ctr"/>
+            <a:r>
+              <a:rPr lang="en-US" sz="2400" b="1" dirty="0"/>
+              <a:t>WASI</a:t>
+            </a:r>
+          </a:p>
+        </p:txBody>
+      </p:sp>
+      <p:sp>
+        <p:nvSpPr>
+          <p:cNvPr id="24" name="Arrow: Left-Right 17">
+            <a:extLst>
+              <a:ext uri="{FF2B5EF4-FFF2-40B4-BE49-F238E27FC236}">
+                <a16:creationId xmlns:a16="http://schemas.microsoft.com/office/drawing/2014/main" id="{CE1E5F0D-D16C-BD8D-35A5-EBB8743B6C0E}"/>
+              </a:ext>
+            </a:extLst>
+          </p:cNvPr>
+          <p:cNvSpPr/>
+          <p:nvPr/>
+        </p:nvSpPr>
+        <p:spPr>
+          <a:xfrm rot="10800000">
+            <a:off x="3979332" y="5500091"/>
+            <a:ext cx="4030397" cy="222238"/>
+          </a:xfrm>
+          <a:prstGeom prst="leftRightArrow">
+            <a:avLst/>
+          </a:prstGeom>
+          <a:solidFill>
+            <a:schemeClr val="accent6">
+              <a:lumMod val="40000"/>
+              <a:lumOff val="60000"/>
+            </a:schemeClr>
+          </a:solidFill>
+        </p:spPr>
+        <p:style>
+          <a:lnRef idx="2">
+            <a:schemeClr val="accent1">
+              <a:shade val="50000"/>
+            </a:schemeClr>
+          </a:lnRef>
+          <a:fillRef idx="1">
+            <a:schemeClr val="accent1"/>
+          </a:fillRef>
+          <a:effectRef idx="0">
+            <a:schemeClr val="accent1"/>
+          </a:effectRef>
+          <a:fontRef idx="minor">
+            <a:schemeClr val="lt1"/>
+          </a:fontRef>
+        </p:style>
+        <p:txBody>
+          <a:bodyPr rtlCol="0" anchor="ctr"/>
+          <a:lstStyle/>
+          <a:p>
+            <a:pPr algn="ctr"/>
+            <a:endParaRPr lang="en-NZ"/>
+          </a:p>
+        </p:txBody>
+      </p:sp>
+      <p:sp>
+        <p:nvSpPr>
+          <p:cNvPr id="8" name="Arrow: Left-Right 15">
+            <a:extLst>
+              <a:ext uri="{FF2B5EF4-FFF2-40B4-BE49-F238E27FC236}">
+                <a16:creationId xmlns:a16="http://schemas.microsoft.com/office/drawing/2014/main" id="{B1AC62FE-50B6-1762-2B3F-042D702E8AEA}"/>
+              </a:ext>
+            </a:extLst>
+          </p:cNvPr>
+          <p:cNvSpPr/>
+          <p:nvPr/>
+        </p:nvSpPr>
+        <p:spPr>
+          <a:xfrm rot="5400000">
+            <a:off x="7822646" y="4407920"/>
+            <a:ext cx="1558286" cy="222238"/>
+          </a:xfrm>
+          <a:prstGeom prst="leftRightArrow">
+            <a:avLst/>
+          </a:prstGeom>
+          <a:solidFill>
+            <a:schemeClr val="accent4">
+              <a:lumMod val="20000"/>
+              <a:lumOff val="80000"/>
+            </a:schemeClr>
+          </a:solidFill>
+        </p:spPr>
+        <p:style>
+          <a:lnRef idx="2">
+            <a:schemeClr val="accent1">
+              <a:shade val="50000"/>
+            </a:schemeClr>
+          </a:lnRef>
+          <a:fillRef idx="1">
+            <a:schemeClr val="accent1"/>
+          </a:fillRef>
+          <a:effectRef idx="0">
+            <a:schemeClr val="accent1"/>
+          </a:effectRef>
+          <a:fontRef idx="minor">
+            <a:schemeClr val="lt1"/>
+          </a:fontRef>
+        </p:style>
+        <p:txBody>
+          <a:bodyPr rtlCol="0" anchor="ctr"/>
+          <a:lstStyle/>
+          <a:p>
+            <a:pPr algn="ctr"/>
+            <a:endParaRPr lang="en-NZ"/>
           </a:p>
         </p:txBody>
       </p:sp>
     </p:spTree>
     <p:extLst>
       <p:ext uri="{BB962C8B-B14F-4D97-AF65-F5344CB8AC3E}">
-        <p14:creationId xmlns:p14="http://schemas.microsoft.com/office/powerpoint/2010/main" val="2055876694"/>
+        <p14:creationId xmlns:p14="http://schemas.microsoft.com/office/powerpoint/2010/main" val="1418076369"/>
       </p:ext>
     </p:extLst>
   </p:cSld>
@@ -8644,6 +9209,2403 @@
     <p:extLst>
       <p:ext uri="{BB962C8B-B14F-4D97-AF65-F5344CB8AC3E}">
         <p14:creationId xmlns:p14="http://schemas.microsoft.com/office/powerpoint/2010/main" val="1639560105"/>
+      </p:ext>
+    </p:extLst>
+  </p:cSld>
+  <p:clrMapOvr>
+    <a:masterClrMapping/>
+  </p:clrMapOvr>
+  <p:transition spd="med">
+    <p:fade/>
+  </p:transition>
+</p:sld>
+</file>
+
+<file path=ppt/slides/slide20.xml><?xml version="1.0" encoding="utf-8"?>
+<p:sld xmlns:a="http://schemas.openxmlformats.org/drawingml/2006/main" xmlns:r="http://schemas.openxmlformats.org/officeDocument/2006/relationships" xmlns:p="http://schemas.openxmlformats.org/presentationml/2006/main">
+  <p:cSld>
+    <p:bg>
+      <p:bgPr>
+        <a:solidFill>
+          <a:srgbClr val="ECE5EE"/>
+        </a:solidFill>
+        <a:effectLst/>
+      </p:bgPr>
+    </p:bg>
+    <p:spTree>
+      <p:nvGrpSpPr>
+        <p:cNvPr id="1" name=""/>
+        <p:cNvGrpSpPr/>
+        <p:nvPr/>
+      </p:nvGrpSpPr>
+      <p:grpSpPr>
+        <a:xfrm>
+          <a:off x="0" y="0"/>
+          <a:ext cx="0" cy="0"/>
+          <a:chOff x="0" y="0"/>
+          <a:chExt cx="0" cy="0"/>
+        </a:xfrm>
+      </p:grpSpPr>
+      <p:pic>
+        <p:nvPicPr>
+          <p:cNvPr id="15" name="Picture 15" descr="Icon&#10;&#10;Description automatically generated">
+            <a:extLst>
+              <a:ext uri="{FF2B5EF4-FFF2-40B4-BE49-F238E27FC236}">
+                <a16:creationId xmlns:a16="http://schemas.microsoft.com/office/drawing/2014/main" id="{D8D6748C-0585-41A5-8CF9-038CF8AE4A95}"/>
+              </a:ext>
+            </a:extLst>
+          </p:cNvPr>
+          <p:cNvPicPr>
+            <a:picLocks noChangeAspect="1"/>
+          </p:cNvPicPr>
+          <p:nvPr/>
+        </p:nvPicPr>
+        <p:blipFill>
+          <a:blip r:embed="rId2"/>
+          <a:stretch>
+            <a:fillRect/>
+          </a:stretch>
+        </p:blipFill>
+        <p:spPr>
+          <a:xfrm>
+            <a:off x="10767011" y="5454852"/>
+            <a:ext cx="1039620" cy="1039665"/>
+          </a:xfrm>
+          <a:prstGeom prst="rect">
+            <a:avLst/>
+          </a:prstGeom>
+        </p:spPr>
+      </p:pic>
+      <p:sp>
+        <p:nvSpPr>
+          <p:cNvPr id="16" name="Title 1">
+            <a:extLst>
+              <a:ext uri="{FF2B5EF4-FFF2-40B4-BE49-F238E27FC236}">
+                <a16:creationId xmlns:a16="http://schemas.microsoft.com/office/drawing/2014/main" id="{11CD93ED-E289-E8A9-3270-139C577567E3}"/>
+              </a:ext>
+            </a:extLst>
+          </p:cNvPr>
+          <p:cNvSpPr txBox="1">
+            <a:spLocks/>
+          </p:cNvSpPr>
+          <p:nvPr/>
+        </p:nvSpPr>
+        <p:spPr>
+          <a:xfrm>
+            <a:off x="355408" y="746749"/>
+            <a:ext cx="11481184" cy="883123"/>
+          </a:xfrm>
+          <a:prstGeom prst="rect">
+            <a:avLst/>
+          </a:prstGeom>
+        </p:spPr>
+        <p:txBody>
+          <a:bodyPr vert="horz" lIns="91440" tIns="45720" rIns="91440" bIns="45720" rtlCol="0" anchor="ctr">
+            <a:normAutofit/>
+          </a:bodyPr>
+          <a:lstStyle>
+            <a:lvl1pPr algn="l" defTabSz="914400" rtl="0" eaLnBrk="1" latinLnBrk="0" hangingPunct="1">
+              <a:lnSpc>
+                <a:spcPct val="90000"/>
+              </a:lnSpc>
+              <a:spcBef>
+                <a:spcPct val="0"/>
+              </a:spcBef>
+              <a:buNone/>
+              <a:defRPr sz="4400" kern="1200">
+                <a:solidFill>
+                  <a:schemeClr val="tx1"/>
+                </a:solidFill>
+                <a:latin typeface="+mj-lt"/>
+                <a:ea typeface="+mj-ea"/>
+                <a:cs typeface="+mj-cs"/>
+              </a:defRPr>
+            </a:lvl1pPr>
+          </a:lstStyle>
+          <a:p>
+            <a:pPr algn="ctr"/>
+            <a:r>
+              <a:rPr lang="en-US" sz="4000" b="1" dirty="0">
+                <a:solidFill>
+                  <a:srgbClr val="0D203F"/>
+                </a:solidFill>
+                <a:latin typeface="+mn-lt"/>
+                <a:cs typeface="Calibri Light"/>
+              </a:rPr>
+              <a:t>inside: wit</a:t>
+            </a:r>
+          </a:p>
+        </p:txBody>
+      </p:sp>
+      <p:sp>
+        <p:nvSpPr>
+          <p:cNvPr id="2" name="Rectangle: Rounded Corners 1">
+            <a:extLst>
+              <a:ext uri="{FF2B5EF4-FFF2-40B4-BE49-F238E27FC236}">
+                <a16:creationId xmlns:a16="http://schemas.microsoft.com/office/drawing/2014/main" id="{84E71B34-6FAE-76A1-ADD6-6197C0B72B27}"/>
+              </a:ext>
+            </a:extLst>
+          </p:cNvPr>
+          <p:cNvSpPr/>
+          <p:nvPr/>
+        </p:nvSpPr>
+        <p:spPr>
+          <a:xfrm>
+            <a:off x="6059940" y="2281703"/>
+            <a:ext cx="1568422" cy="1769597"/>
+          </a:xfrm>
+          <a:prstGeom prst="roundRect">
+            <a:avLst/>
+          </a:prstGeom>
+          <a:solidFill>
+            <a:schemeClr val="accent2"/>
+          </a:solidFill>
+          <a:effectLst>
+            <a:outerShdw blurRad="50800" dist="38100" dir="2700000" algn="tl" rotWithShape="0">
+              <a:prstClr val="black">
+                <a:alpha val="40000"/>
+              </a:prstClr>
+            </a:outerShdw>
+          </a:effectLst>
+        </p:spPr>
+        <p:style>
+          <a:lnRef idx="2">
+            <a:schemeClr val="accent1">
+              <a:shade val="50000"/>
+            </a:schemeClr>
+          </a:lnRef>
+          <a:fillRef idx="1">
+            <a:schemeClr val="accent1"/>
+          </a:fillRef>
+          <a:effectRef idx="0">
+            <a:schemeClr val="accent1"/>
+          </a:effectRef>
+          <a:fontRef idx="minor">
+            <a:schemeClr val="lt1"/>
+          </a:fontRef>
+        </p:style>
+        <p:txBody>
+          <a:bodyPr rtlCol="0" anchor="ctr"/>
+          <a:lstStyle/>
+          <a:p>
+            <a:pPr algn="ctr"/>
+            <a:r>
+              <a:rPr lang="en-NZ" sz="2400" b="1" dirty="0"/>
+              <a:t>Mono VES</a:t>
+            </a:r>
+          </a:p>
+          <a:p>
+            <a:pPr algn="ctr"/>
+            <a:r>
+              <a:rPr lang="en-NZ" dirty="0"/>
+              <a:t>(C compiled to </a:t>
+            </a:r>
+            <a:r>
+              <a:rPr lang="en-NZ" dirty="0" err="1"/>
+              <a:t>Wasm</a:t>
+            </a:r>
+            <a:r>
+              <a:rPr lang="en-NZ" dirty="0"/>
+              <a:t>)</a:t>
+            </a:r>
+          </a:p>
+        </p:txBody>
+      </p:sp>
+      <p:sp>
+        <p:nvSpPr>
+          <p:cNvPr id="4" name="Rectangle: Rounded Corners 3">
+            <a:extLst>
+              <a:ext uri="{FF2B5EF4-FFF2-40B4-BE49-F238E27FC236}">
+                <a16:creationId xmlns:a16="http://schemas.microsoft.com/office/drawing/2014/main" id="{316002EF-3F4E-8990-C676-446D6AAFEBFF}"/>
+              </a:ext>
+            </a:extLst>
+          </p:cNvPr>
+          <p:cNvSpPr/>
+          <p:nvPr/>
+        </p:nvSpPr>
+        <p:spPr>
+          <a:xfrm>
+            <a:off x="7792230" y="2464861"/>
+            <a:ext cx="1568422" cy="2521860"/>
+          </a:xfrm>
+          <a:prstGeom prst="roundRect">
+            <a:avLst/>
+          </a:prstGeom>
+          <a:effectLst>
+            <a:outerShdw blurRad="50800" dist="38100" dir="2700000" algn="tl" rotWithShape="0">
+              <a:prstClr val="black">
+                <a:alpha val="40000"/>
+              </a:prstClr>
+            </a:outerShdw>
+          </a:effectLst>
+        </p:spPr>
+        <p:style>
+          <a:lnRef idx="2">
+            <a:schemeClr val="accent1">
+              <a:shade val="50000"/>
+            </a:schemeClr>
+          </a:lnRef>
+          <a:fillRef idx="1">
+            <a:schemeClr val="accent1"/>
+          </a:fillRef>
+          <a:effectRef idx="0">
+            <a:schemeClr val="accent1"/>
+          </a:effectRef>
+          <a:fontRef idx="minor">
+            <a:schemeClr val="lt1"/>
+          </a:fontRef>
+        </p:style>
+        <p:txBody>
+          <a:bodyPr rtlCol="0" anchor="ctr"/>
+          <a:lstStyle/>
+          <a:p>
+            <a:pPr algn="ctr"/>
+            <a:r>
+              <a:rPr lang="en-NZ" sz="2400" b="1" dirty="0"/>
+              <a:t>User </a:t>
+            </a:r>
+            <a:r>
+              <a:rPr lang="en-NZ" sz="2400" b="1" dirty="0" err="1"/>
+              <a:t>impl</a:t>
+            </a:r>
+            <a:endParaRPr lang="en-NZ" sz="2400" b="1" dirty="0"/>
+          </a:p>
+          <a:p>
+            <a:pPr algn="ctr"/>
+            <a:r>
+              <a:rPr lang="en-NZ" dirty="0"/>
+              <a:t>(IL)</a:t>
+            </a:r>
+          </a:p>
+        </p:txBody>
+      </p:sp>
+      <p:sp>
+        <p:nvSpPr>
+          <p:cNvPr id="7" name="Rectangle: Rounded Corners 6">
+            <a:extLst>
+              <a:ext uri="{FF2B5EF4-FFF2-40B4-BE49-F238E27FC236}">
+                <a16:creationId xmlns:a16="http://schemas.microsoft.com/office/drawing/2014/main" id="{8D4B1432-FA00-0997-9B5D-0B6BF4AC68B2}"/>
+              </a:ext>
+            </a:extLst>
+          </p:cNvPr>
+          <p:cNvSpPr/>
+          <p:nvPr/>
+        </p:nvSpPr>
+        <p:spPr>
+          <a:xfrm>
+            <a:off x="2831348" y="1946274"/>
+            <a:ext cx="1450428" cy="4289426"/>
+          </a:xfrm>
+          <a:prstGeom prst="roundRect">
+            <a:avLst/>
+          </a:prstGeom>
+          <a:solidFill>
+            <a:schemeClr val="accent2"/>
+          </a:solidFill>
+          <a:effectLst>
+            <a:outerShdw blurRad="50800" dist="38100" dir="2700000" algn="tl" rotWithShape="0">
+              <a:prstClr val="black">
+                <a:alpha val="40000"/>
+              </a:prstClr>
+            </a:outerShdw>
+          </a:effectLst>
+        </p:spPr>
+        <p:style>
+          <a:lnRef idx="2">
+            <a:schemeClr val="accent1">
+              <a:shade val="50000"/>
+            </a:schemeClr>
+          </a:lnRef>
+          <a:fillRef idx="1">
+            <a:schemeClr val="accent1"/>
+          </a:fillRef>
+          <a:effectRef idx="0">
+            <a:schemeClr val="accent1"/>
+          </a:effectRef>
+          <a:fontRef idx="minor">
+            <a:schemeClr val="lt1"/>
+          </a:fontRef>
+        </p:style>
+        <p:txBody>
+          <a:bodyPr tIns="864000" rtlCol="0" anchor="t" anchorCtr="0"/>
+          <a:lstStyle/>
+          <a:p>
+            <a:pPr algn="ctr"/>
+            <a:r>
+              <a:rPr lang="en-NZ" sz="2400" b="1" dirty="0"/>
+              <a:t>Host</a:t>
+            </a:r>
+          </a:p>
+        </p:txBody>
+      </p:sp>
+      <p:sp>
+        <p:nvSpPr>
+          <p:cNvPr id="19" name="Rectangle: Rounded Corners 6">
+            <a:extLst>
+              <a:ext uri="{FF2B5EF4-FFF2-40B4-BE49-F238E27FC236}">
+                <a16:creationId xmlns:a16="http://schemas.microsoft.com/office/drawing/2014/main" id="{C9E444C5-15D8-BEBD-3A02-7B4C46296033}"/>
+              </a:ext>
+            </a:extLst>
+          </p:cNvPr>
+          <p:cNvSpPr/>
+          <p:nvPr/>
+        </p:nvSpPr>
+        <p:spPr>
+          <a:xfrm>
+            <a:off x="4445644" y="2105691"/>
+            <a:ext cx="1450428" cy="2059909"/>
+          </a:xfrm>
+          <a:prstGeom prst="roundRect">
+            <a:avLst/>
+          </a:prstGeom>
+          <a:solidFill>
+            <a:schemeClr val="accent2"/>
+          </a:solidFill>
+          <a:effectLst>
+            <a:outerShdw blurRad="50800" dist="38100" dir="2700000" algn="tl" rotWithShape="0">
+              <a:prstClr val="black">
+                <a:alpha val="40000"/>
+              </a:prstClr>
+            </a:outerShdw>
+          </a:effectLst>
+        </p:spPr>
+        <p:style>
+          <a:lnRef idx="2">
+            <a:schemeClr val="accent1">
+              <a:shade val="50000"/>
+            </a:schemeClr>
+          </a:lnRef>
+          <a:fillRef idx="1">
+            <a:schemeClr val="accent1"/>
+          </a:fillRef>
+          <a:effectRef idx="0">
+            <a:schemeClr val="accent1"/>
+          </a:effectRef>
+          <a:fontRef idx="minor">
+            <a:schemeClr val="lt1"/>
+          </a:fontRef>
+        </p:style>
+        <p:txBody>
+          <a:bodyPr rtlCol="0" anchor="ctr"/>
+          <a:lstStyle/>
+          <a:p>
+            <a:pPr algn="ctr"/>
+            <a:r>
+              <a:rPr lang="en-NZ" sz="2400" b="1" dirty="0"/>
+              <a:t>export</a:t>
+            </a:r>
+          </a:p>
+          <a:p>
+            <a:pPr algn="ctr"/>
+            <a:r>
+              <a:rPr lang="en-NZ" dirty="0"/>
+              <a:t>(C compiled to </a:t>
+            </a:r>
+            <a:r>
+              <a:rPr lang="en-NZ" dirty="0" err="1"/>
+              <a:t>Wasm</a:t>
+            </a:r>
+            <a:r>
+              <a:rPr lang="en-NZ" dirty="0"/>
+              <a:t>)</a:t>
+            </a:r>
+          </a:p>
+        </p:txBody>
+      </p:sp>
+      <p:sp>
+        <p:nvSpPr>
+          <p:cNvPr id="22" name="Rectangle: Rounded Corners 3">
+            <a:extLst>
+              <a:ext uri="{FF2B5EF4-FFF2-40B4-BE49-F238E27FC236}">
+                <a16:creationId xmlns:a16="http://schemas.microsoft.com/office/drawing/2014/main" id="{30AB942A-841C-03C8-6110-82B95554BCCB}"/>
+              </a:ext>
+            </a:extLst>
+          </p:cNvPr>
+          <p:cNvSpPr/>
+          <p:nvPr/>
+        </p:nvSpPr>
+        <p:spPr>
+          <a:xfrm>
+            <a:off x="7792230" y="5159266"/>
+            <a:ext cx="1568422" cy="903889"/>
+          </a:xfrm>
+          <a:prstGeom prst="roundRect">
+            <a:avLst/>
+          </a:prstGeom>
+          <a:effectLst>
+            <a:outerShdw blurRad="50800" dist="38100" dir="2700000" algn="tl" rotWithShape="0">
+              <a:prstClr val="black">
+                <a:alpha val="40000"/>
+              </a:prstClr>
+            </a:outerShdw>
+          </a:effectLst>
+        </p:spPr>
+        <p:style>
+          <a:lnRef idx="2">
+            <a:schemeClr val="accent1">
+              <a:shade val="50000"/>
+            </a:schemeClr>
+          </a:lnRef>
+          <a:fillRef idx="1">
+            <a:schemeClr val="accent1"/>
+          </a:fillRef>
+          <a:effectRef idx="0">
+            <a:schemeClr val="accent1"/>
+          </a:effectRef>
+          <a:fontRef idx="minor">
+            <a:schemeClr val="lt1"/>
+          </a:fontRef>
+        </p:style>
+        <p:txBody>
+          <a:bodyPr rtlCol="0" anchor="ctr"/>
+          <a:lstStyle/>
+          <a:p>
+            <a:pPr algn="ctr"/>
+            <a:r>
+              <a:rPr lang="en-NZ" sz="2400" b="1" dirty="0"/>
+              <a:t>BCL</a:t>
+            </a:r>
+          </a:p>
+          <a:p>
+            <a:pPr algn="ctr"/>
+            <a:r>
+              <a:rPr lang="en-NZ" dirty="0"/>
+              <a:t>(IL)</a:t>
+            </a:r>
+          </a:p>
+        </p:txBody>
+      </p:sp>
+      <p:sp>
+        <p:nvSpPr>
+          <p:cNvPr id="23" name="Rounded Rectangle 22">
+            <a:extLst>
+              <a:ext uri="{FF2B5EF4-FFF2-40B4-BE49-F238E27FC236}">
+                <a16:creationId xmlns:a16="http://schemas.microsoft.com/office/drawing/2014/main" id="{67657268-8594-58EC-5277-9A165FEE4016}"/>
+              </a:ext>
+            </a:extLst>
+          </p:cNvPr>
+          <p:cNvSpPr/>
+          <p:nvPr/>
+        </p:nvSpPr>
+        <p:spPr>
+          <a:xfrm>
+            <a:off x="2963917" y="5159266"/>
+            <a:ext cx="1177159" cy="903889"/>
+          </a:xfrm>
+          <a:prstGeom prst="roundRect">
+            <a:avLst/>
+          </a:prstGeom>
+        </p:spPr>
+        <p:style>
+          <a:lnRef idx="2">
+            <a:schemeClr val="accent1">
+              <a:shade val="50000"/>
+            </a:schemeClr>
+          </a:lnRef>
+          <a:fillRef idx="1">
+            <a:schemeClr val="accent1"/>
+          </a:fillRef>
+          <a:effectRef idx="0">
+            <a:schemeClr val="accent1"/>
+          </a:effectRef>
+          <a:fontRef idx="minor">
+            <a:schemeClr val="lt1"/>
+          </a:fontRef>
+        </p:style>
+        <p:txBody>
+          <a:bodyPr rtlCol="0" anchor="ctr"/>
+          <a:lstStyle/>
+          <a:p>
+            <a:pPr algn="ctr"/>
+            <a:r>
+              <a:rPr lang="en-US" sz="2400" b="1" dirty="0"/>
+              <a:t>WASI</a:t>
+            </a:r>
+          </a:p>
+        </p:txBody>
+      </p:sp>
+      <p:sp>
+        <p:nvSpPr>
+          <p:cNvPr id="24" name="Arrow: Left-Right 17">
+            <a:extLst>
+              <a:ext uri="{FF2B5EF4-FFF2-40B4-BE49-F238E27FC236}">
+                <a16:creationId xmlns:a16="http://schemas.microsoft.com/office/drawing/2014/main" id="{CE1E5F0D-D16C-BD8D-35A5-EBB8743B6C0E}"/>
+              </a:ext>
+            </a:extLst>
+          </p:cNvPr>
+          <p:cNvSpPr/>
+          <p:nvPr/>
+        </p:nvSpPr>
+        <p:spPr>
+          <a:xfrm rot="10800000">
+            <a:off x="3979332" y="5500091"/>
+            <a:ext cx="4030397" cy="222238"/>
+          </a:xfrm>
+          <a:prstGeom prst="leftRightArrow">
+            <a:avLst/>
+          </a:prstGeom>
+          <a:solidFill>
+            <a:schemeClr val="accent6">
+              <a:lumMod val="40000"/>
+              <a:lumOff val="60000"/>
+            </a:schemeClr>
+          </a:solidFill>
+        </p:spPr>
+        <p:style>
+          <a:lnRef idx="2">
+            <a:schemeClr val="accent1">
+              <a:shade val="50000"/>
+            </a:schemeClr>
+          </a:lnRef>
+          <a:fillRef idx="1">
+            <a:schemeClr val="accent1"/>
+          </a:fillRef>
+          <a:effectRef idx="0">
+            <a:schemeClr val="accent1"/>
+          </a:effectRef>
+          <a:fontRef idx="minor">
+            <a:schemeClr val="lt1"/>
+          </a:fontRef>
+        </p:style>
+        <p:txBody>
+          <a:bodyPr rtlCol="0" anchor="ctr"/>
+          <a:lstStyle/>
+          <a:p>
+            <a:pPr algn="ctr"/>
+            <a:endParaRPr lang="en-NZ"/>
+          </a:p>
+        </p:txBody>
+      </p:sp>
+      <p:sp>
+        <p:nvSpPr>
+          <p:cNvPr id="3" name="Rounded Rectangle 2">
+            <a:extLst>
+              <a:ext uri="{FF2B5EF4-FFF2-40B4-BE49-F238E27FC236}">
+                <a16:creationId xmlns:a16="http://schemas.microsoft.com/office/drawing/2014/main" id="{69450591-6EBB-7AF6-5669-E02DB29C8ADD}"/>
+              </a:ext>
+            </a:extLst>
+          </p:cNvPr>
+          <p:cNvSpPr/>
+          <p:nvPr/>
+        </p:nvSpPr>
+        <p:spPr>
+          <a:xfrm>
+            <a:off x="2963916" y="4495800"/>
+            <a:ext cx="1177159" cy="587380"/>
+          </a:xfrm>
+          <a:prstGeom prst="roundRect">
+            <a:avLst/>
+          </a:prstGeom>
+        </p:spPr>
+        <p:style>
+          <a:lnRef idx="2">
+            <a:schemeClr val="accent1">
+              <a:shade val="50000"/>
+            </a:schemeClr>
+          </a:lnRef>
+          <a:fillRef idx="1">
+            <a:schemeClr val="accent1"/>
+          </a:fillRef>
+          <a:effectRef idx="0">
+            <a:schemeClr val="accent1"/>
+          </a:effectRef>
+          <a:fontRef idx="minor">
+            <a:schemeClr val="lt1"/>
+          </a:fontRef>
+        </p:style>
+        <p:txBody>
+          <a:bodyPr rtlCol="0" anchor="ctr"/>
+          <a:lstStyle/>
+          <a:p>
+            <a:pPr algn="ctr"/>
+            <a:r>
+              <a:rPr lang="en-US" sz="2400" b="1" dirty="0"/>
+              <a:t>export</a:t>
+            </a:r>
+          </a:p>
+        </p:txBody>
+      </p:sp>
+      <p:sp>
+        <p:nvSpPr>
+          <p:cNvPr id="5" name="Rectangle: Rounded Corners 6">
+            <a:extLst>
+              <a:ext uri="{FF2B5EF4-FFF2-40B4-BE49-F238E27FC236}">
+                <a16:creationId xmlns:a16="http://schemas.microsoft.com/office/drawing/2014/main" id="{8817D75A-8E5F-1180-B362-11BA81923612}"/>
+              </a:ext>
+            </a:extLst>
+          </p:cNvPr>
+          <p:cNvSpPr/>
+          <p:nvPr/>
+        </p:nvSpPr>
+        <p:spPr>
+          <a:xfrm>
+            <a:off x="4445644" y="4240353"/>
+            <a:ext cx="1450428" cy="1214500"/>
+          </a:xfrm>
+          <a:prstGeom prst="roundRect">
+            <a:avLst/>
+          </a:prstGeom>
+          <a:solidFill>
+            <a:schemeClr val="accent2"/>
+          </a:solidFill>
+          <a:effectLst>
+            <a:outerShdw blurRad="50800" dist="38100" dir="2700000" algn="tl" rotWithShape="0">
+              <a:prstClr val="black">
+                <a:alpha val="40000"/>
+              </a:prstClr>
+            </a:outerShdw>
+          </a:effectLst>
+        </p:spPr>
+        <p:style>
+          <a:lnRef idx="2">
+            <a:schemeClr val="accent1">
+              <a:shade val="50000"/>
+            </a:schemeClr>
+          </a:lnRef>
+          <a:fillRef idx="1">
+            <a:schemeClr val="accent1"/>
+          </a:fillRef>
+          <a:effectRef idx="0">
+            <a:schemeClr val="accent1"/>
+          </a:effectRef>
+          <a:fontRef idx="minor">
+            <a:schemeClr val="lt1"/>
+          </a:fontRef>
+        </p:style>
+        <p:txBody>
+          <a:bodyPr rtlCol="0" anchor="ctr"/>
+          <a:lstStyle/>
+          <a:p>
+            <a:pPr algn="ctr"/>
+            <a:r>
+              <a:rPr lang="en-NZ" sz="2400" b="1" dirty="0"/>
+              <a:t>import</a:t>
+            </a:r>
+          </a:p>
+          <a:p>
+            <a:pPr algn="ctr"/>
+            <a:r>
+              <a:rPr lang="en-NZ" dirty="0"/>
+              <a:t>(C compiled to </a:t>
+            </a:r>
+            <a:r>
+              <a:rPr lang="en-NZ" dirty="0" err="1"/>
+              <a:t>Wasm</a:t>
+            </a:r>
+            <a:r>
+              <a:rPr lang="en-NZ" dirty="0"/>
+              <a:t>)</a:t>
+            </a:r>
+          </a:p>
+        </p:txBody>
+      </p:sp>
+      <p:sp>
+        <p:nvSpPr>
+          <p:cNvPr id="6" name="Arrow: Left-Right 17">
+            <a:extLst>
+              <a:ext uri="{FF2B5EF4-FFF2-40B4-BE49-F238E27FC236}">
+                <a16:creationId xmlns:a16="http://schemas.microsoft.com/office/drawing/2014/main" id="{FE8CB4E9-5261-3BE4-82FB-EAC5E6400D23}"/>
+              </a:ext>
+            </a:extLst>
+          </p:cNvPr>
+          <p:cNvSpPr/>
+          <p:nvPr/>
+        </p:nvSpPr>
+        <p:spPr>
+          <a:xfrm rot="10800000">
+            <a:off x="3979331" y="4691407"/>
+            <a:ext cx="656463" cy="222238"/>
+          </a:xfrm>
+          <a:prstGeom prst="leftRightArrow">
+            <a:avLst/>
+          </a:prstGeom>
+          <a:solidFill>
+            <a:schemeClr val="accent6">
+              <a:lumMod val="40000"/>
+              <a:lumOff val="60000"/>
+            </a:schemeClr>
+          </a:solidFill>
+        </p:spPr>
+        <p:style>
+          <a:lnRef idx="2">
+            <a:schemeClr val="accent1">
+              <a:shade val="50000"/>
+            </a:schemeClr>
+          </a:lnRef>
+          <a:fillRef idx="1">
+            <a:schemeClr val="accent1"/>
+          </a:fillRef>
+          <a:effectRef idx="0">
+            <a:schemeClr val="accent1"/>
+          </a:effectRef>
+          <a:fontRef idx="minor">
+            <a:schemeClr val="lt1"/>
+          </a:fontRef>
+        </p:style>
+        <p:txBody>
+          <a:bodyPr rtlCol="0" anchor="ctr"/>
+          <a:lstStyle/>
+          <a:p>
+            <a:pPr algn="ctr"/>
+            <a:endParaRPr lang="en-NZ"/>
+          </a:p>
+        </p:txBody>
+      </p:sp>
+      <p:sp>
+        <p:nvSpPr>
+          <p:cNvPr id="8" name="Arrow: Left-Right 15">
+            <a:extLst>
+              <a:ext uri="{FF2B5EF4-FFF2-40B4-BE49-F238E27FC236}">
+                <a16:creationId xmlns:a16="http://schemas.microsoft.com/office/drawing/2014/main" id="{B1AC62FE-50B6-1762-2B3F-042D702E8AEA}"/>
+              </a:ext>
+            </a:extLst>
+          </p:cNvPr>
+          <p:cNvSpPr/>
+          <p:nvPr/>
+        </p:nvSpPr>
+        <p:spPr>
+          <a:xfrm rot="5400000">
+            <a:off x="8353961" y="4939235"/>
+            <a:ext cx="495656" cy="222238"/>
+          </a:xfrm>
+          <a:prstGeom prst="leftRightArrow">
+            <a:avLst/>
+          </a:prstGeom>
+          <a:solidFill>
+            <a:schemeClr val="accent4">
+              <a:lumMod val="20000"/>
+              <a:lumOff val="80000"/>
+            </a:schemeClr>
+          </a:solidFill>
+        </p:spPr>
+        <p:style>
+          <a:lnRef idx="2">
+            <a:schemeClr val="accent1">
+              <a:shade val="50000"/>
+            </a:schemeClr>
+          </a:lnRef>
+          <a:fillRef idx="1">
+            <a:schemeClr val="accent1"/>
+          </a:fillRef>
+          <a:effectRef idx="0">
+            <a:schemeClr val="accent1"/>
+          </a:effectRef>
+          <a:fontRef idx="minor">
+            <a:schemeClr val="lt1"/>
+          </a:fontRef>
+        </p:style>
+        <p:txBody>
+          <a:bodyPr rtlCol="0" anchor="ctr"/>
+          <a:lstStyle/>
+          <a:p>
+            <a:pPr algn="ctr"/>
+            <a:endParaRPr lang="en-NZ"/>
+          </a:p>
+        </p:txBody>
+      </p:sp>
+      <p:sp>
+        <p:nvSpPr>
+          <p:cNvPr id="9" name="Arrow: Left-Right 15">
+            <a:extLst>
+              <a:ext uri="{FF2B5EF4-FFF2-40B4-BE49-F238E27FC236}">
+                <a16:creationId xmlns:a16="http://schemas.microsoft.com/office/drawing/2014/main" id="{2B91E721-077C-7507-851D-2ADFEB556F51}"/>
+              </a:ext>
+            </a:extLst>
+          </p:cNvPr>
+          <p:cNvSpPr/>
+          <p:nvPr/>
+        </p:nvSpPr>
+        <p:spPr>
+          <a:xfrm rot="10800000">
+            <a:off x="5734492" y="4736484"/>
+            <a:ext cx="2275236" cy="222238"/>
+          </a:xfrm>
+          <a:prstGeom prst="leftRightArrow">
+            <a:avLst/>
+          </a:prstGeom>
+          <a:solidFill>
+            <a:schemeClr val="accent4">
+              <a:lumMod val="20000"/>
+              <a:lumOff val="80000"/>
+            </a:schemeClr>
+          </a:solidFill>
+        </p:spPr>
+        <p:style>
+          <a:lnRef idx="2">
+            <a:schemeClr val="accent1">
+              <a:shade val="50000"/>
+            </a:schemeClr>
+          </a:lnRef>
+          <a:fillRef idx="1">
+            <a:schemeClr val="accent1"/>
+          </a:fillRef>
+          <a:effectRef idx="0">
+            <a:schemeClr val="accent1"/>
+          </a:effectRef>
+          <a:fontRef idx="minor">
+            <a:schemeClr val="lt1"/>
+          </a:fontRef>
+        </p:style>
+        <p:txBody>
+          <a:bodyPr rtlCol="0" anchor="ctr"/>
+          <a:lstStyle/>
+          <a:p>
+            <a:pPr algn="ctr"/>
+            <a:endParaRPr lang="en-NZ"/>
+          </a:p>
+        </p:txBody>
+      </p:sp>
+    </p:spTree>
+    <p:extLst>
+      <p:ext uri="{BB962C8B-B14F-4D97-AF65-F5344CB8AC3E}">
+        <p14:creationId xmlns:p14="http://schemas.microsoft.com/office/powerpoint/2010/main" val="1688640337"/>
+      </p:ext>
+    </p:extLst>
+  </p:cSld>
+  <p:clrMapOvr>
+    <a:masterClrMapping/>
+  </p:clrMapOvr>
+  <p:transition spd="med">
+    <p:fade/>
+  </p:transition>
+</p:sld>
+</file>
+
+<file path=ppt/slides/slide21.xml><?xml version="1.0" encoding="utf-8"?>
+<p:sld xmlns:a="http://schemas.openxmlformats.org/drawingml/2006/main" xmlns:r="http://schemas.openxmlformats.org/officeDocument/2006/relationships" xmlns:p="http://schemas.openxmlformats.org/presentationml/2006/main">
+  <p:cSld>
+    <p:bg>
+      <p:bgPr>
+        <a:solidFill>
+          <a:srgbClr val="ECE5EE"/>
+        </a:solidFill>
+        <a:effectLst/>
+      </p:bgPr>
+    </p:bg>
+    <p:spTree>
+      <p:nvGrpSpPr>
+        <p:cNvPr id="1" name=""/>
+        <p:cNvGrpSpPr/>
+        <p:nvPr/>
+      </p:nvGrpSpPr>
+      <p:grpSpPr>
+        <a:xfrm>
+          <a:off x="0" y="0"/>
+          <a:ext cx="0" cy="0"/>
+          <a:chOff x="0" y="0"/>
+          <a:chExt cx="0" cy="0"/>
+        </a:xfrm>
+      </p:grpSpPr>
+      <p:pic>
+        <p:nvPicPr>
+          <p:cNvPr id="15" name="Picture 15" descr="Icon&#10;&#10;Description automatically generated">
+            <a:extLst>
+              <a:ext uri="{FF2B5EF4-FFF2-40B4-BE49-F238E27FC236}">
+                <a16:creationId xmlns:a16="http://schemas.microsoft.com/office/drawing/2014/main" id="{D8D6748C-0585-41A5-8CF9-038CF8AE4A95}"/>
+              </a:ext>
+            </a:extLst>
+          </p:cNvPr>
+          <p:cNvPicPr>
+            <a:picLocks noChangeAspect="1"/>
+          </p:cNvPicPr>
+          <p:nvPr/>
+        </p:nvPicPr>
+        <p:blipFill>
+          <a:blip r:embed="rId2"/>
+          <a:stretch>
+            <a:fillRect/>
+          </a:stretch>
+        </p:blipFill>
+        <p:spPr>
+          <a:xfrm>
+            <a:off x="10767011" y="5454852"/>
+            <a:ext cx="1039620" cy="1039665"/>
+          </a:xfrm>
+          <a:prstGeom prst="rect">
+            <a:avLst/>
+          </a:prstGeom>
+        </p:spPr>
+      </p:pic>
+      <p:sp>
+        <p:nvSpPr>
+          <p:cNvPr id="8" name="Title 1">
+            <a:extLst>
+              <a:ext uri="{FF2B5EF4-FFF2-40B4-BE49-F238E27FC236}">
+                <a16:creationId xmlns:a16="http://schemas.microsoft.com/office/drawing/2014/main" id="{1F5EBDF9-E3E1-9410-7F69-108A2215720D}"/>
+              </a:ext>
+            </a:extLst>
+          </p:cNvPr>
+          <p:cNvSpPr>
+            <a:spLocks noGrp="1"/>
+          </p:cNvSpPr>
+          <p:nvPr>
+            <p:ph type="title"/>
+          </p:nvPr>
+        </p:nvSpPr>
+        <p:spPr>
+          <a:xfrm>
+            <a:off x="323850" y="1946275"/>
+            <a:ext cx="11481184" cy="1325563"/>
+          </a:xfrm>
+        </p:spPr>
+        <p:txBody>
+          <a:bodyPr>
+            <a:normAutofit/>
+          </a:bodyPr>
+          <a:lstStyle/>
+          <a:p>
+            <a:pPr algn="ctr"/>
+            <a:r>
+              <a:rPr lang="en-US" sz="4000" b="1" dirty="0">
+                <a:solidFill>
+                  <a:srgbClr val="0D203F"/>
+                </a:solidFill>
+                <a:latin typeface="+mn-lt"/>
+                <a:cs typeface="Calibri Light"/>
+              </a:rPr>
+              <a:t>actually </a:t>
+            </a:r>
+            <a:r>
+              <a:rPr lang="en-US" sz="4000" b="1" dirty="0" err="1">
+                <a:solidFill>
+                  <a:srgbClr val="0D203F"/>
+                </a:solidFill>
+                <a:latin typeface="+mn-lt"/>
+                <a:cs typeface="Calibri Light"/>
+              </a:rPr>
+              <a:t>frankencode</a:t>
+            </a:r>
+            <a:r>
+              <a:rPr lang="en-US" sz="4000" b="1" dirty="0">
+                <a:solidFill>
+                  <a:srgbClr val="0D203F"/>
+                </a:solidFill>
+                <a:latin typeface="+mn-lt"/>
+                <a:cs typeface="Calibri Light"/>
+              </a:rPr>
+              <a:t> was the monster</a:t>
+            </a:r>
+          </a:p>
+        </p:txBody>
+      </p:sp>
+      <p:sp>
+        <p:nvSpPr>
+          <p:cNvPr id="9" name="Content Placeholder 2">
+            <a:extLst>
+              <a:ext uri="{FF2B5EF4-FFF2-40B4-BE49-F238E27FC236}">
+                <a16:creationId xmlns:a16="http://schemas.microsoft.com/office/drawing/2014/main" id="{628DDC8C-D4B6-334B-DAAE-F14F9D367722}"/>
+              </a:ext>
+            </a:extLst>
+          </p:cNvPr>
+          <p:cNvSpPr>
+            <a:spLocks noGrp="1"/>
+          </p:cNvSpPr>
+          <p:nvPr>
+            <p:ph idx="1"/>
+          </p:nvPr>
+        </p:nvSpPr>
+        <p:spPr>
+          <a:xfrm>
+            <a:off x="323850" y="3314700"/>
+            <a:ext cx="11481184" cy="2261152"/>
+          </a:xfrm>
+        </p:spPr>
+        <p:txBody>
+          <a:bodyPr vert="horz" lIns="91440" tIns="45720" rIns="91440" bIns="45720" rtlCol="0" anchor="t">
+            <a:normAutofit/>
+          </a:bodyPr>
+          <a:lstStyle/>
+          <a:p>
+            <a:pPr marL="0" indent="0" algn="ctr">
+              <a:buNone/>
+            </a:pPr>
+            <a:endParaRPr lang="en-US" sz="3200" dirty="0">
+              <a:solidFill>
+                <a:srgbClr val="0D203F"/>
+              </a:solidFill>
+              <a:ea typeface="+mn-lt"/>
+              <a:cs typeface="+mn-lt"/>
+            </a:endParaRPr>
+          </a:p>
+        </p:txBody>
+      </p:sp>
+    </p:spTree>
+    <p:extLst>
+      <p:ext uri="{BB962C8B-B14F-4D97-AF65-F5344CB8AC3E}">
+        <p14:creationId xmlns:p14="http://schemas.microsoft.com/office/powerpoint/2010/main" val="3965294251"/>
+      </p:ext>
+    </p:extLst>
+  </p:cSld>
+  <p:clrMapOvr>
+    <a:masterClrMapping/>
+  </p:clrMapOvr>
+  <p:transition spd="med">
+    <p:fade/>
+  </p:transition>
+</p:sld>
+</file>
+
+<file path=ppt/slides/slide22.xml><?xml version="1.0" encoding="utf-8"?>
+<p:sld xmlns:a="http://schemas.openxmlformats.org/drawingml/2006/main" xmlns:r="http://schemas.openxmlformats.org/officeDocument/2006/relationships" xmlns:p="http://schemas.openxmlformats.org/presentationml/2006/main">
+  <p:cSld>
+    <p:bg>
+      <p:bgPr>
+        <a:solidFill>
+          <a:srgbClr val="ECE5EE"/>
+        </a:solidFill>
+        <a:effectLst/>
+      </p:bgPr>
+    </p:bg>
+    <p:spTree>
+      <p:nvGrpSpPr>
+        <p:cNvPr id="1" name=""/>
+        <p:cNvGrpSpPr/>
+        <p:nvPr/>
+      </p:nvGrpSpPr>
+      <p:grpSpPr>
+        <a:xfrm>
+          <a:off x="0" y="0"/>
+          <a:ext cx="0" cy="0"/>
+          <a:chOff x="0" y="0"/>
+          <a:chExt cx="0" cy="0"/>
+        </a:xfrm>
+      </p:grpSpPr>
+      <p:pic>
+        <p:nvPicPr>
+          <p:cNvPr id="15" name="Picture 15" descr="Icon&#10;&#10;Description automatically generated">
+            <a:extLst>
+              <a:ext uri="{FF2B5EF4-FFF2-40B4-BE49-F238E27FC236}">
+                <a16:creationId xmlns:a16="http://schemas.microsoft.com/office/drawing/2014/main" id="{D8D6748C-0585-41A5-8CF9-038CF8AE4A95}"/>
+              </a:ext>
+            </a:extLst>
+          </p:cNvPr>
+          <p:cNvPicPr>
+            <a:picLocks noChangeAspect="1"/>
+          </p:cNvPicPr>
+          <p:nvPr/>
+        </p:nvPicPr>
+        <p:blipFill>
+          <a:blip r:embed="rId2"/>
+          <a:stretch>
+            <a:fillRect/>
+          </a:stretch>
+        </p:blipFill>
+        <p:spPr>
+          <a:xfrm>
+            <a:off x="10767011" y="5454852"/>
+            <a:ext cx="1039620" cy="1039665"/>
+          </a:xfrm>
+          <a:prstGeom prst="rect">
+            <a:avLst/>
+          </a:prstGeom>
+        </p:spPr>
+      </p:pic>
+      <p:sp>
+        <p:nvSpPr>
+          <p:cNvPr id="8" name="Title 1">
+            <a:extLst>
+              <a:ext uri="{FF2B5EF4-FFF2-40B4-BE49-F238E27FC236}">
+                <a16:creationId xmlns:a16="http://schemas.microsoft.com/office/drawing/2014/main" id="{1F5EBDF9-E3E1-9410-7F69-108A2215720D}"/>
+              </a:ext>
+            </a:extLst>
+          </p:cNvPr>
+          <p:cNvSpPr>
+            <a:spLocks noGrp="1"/>
+          </p:cNvSpPr>
+          <p:nvPr>
+            <p:ph type="title"/>
+          </p:nvPr>
+        </p:nvSpPr>
+        <p:spPr>
+          <a:xfrm>
+            <a:off x="323850" y="1946275"/>
+            <a:ext cx="11481184" cy="1325563"/>
+          </a:xfrm>
+        </p:spPr>
+        <p:txBody>
+          <a:bodyPr>
+            <a:normAutofit/>
+          </a:bodyPr>
+          <a:lstStyle/>
+          <a:p>
+            <a:pPr algn="ctr"/>
+            <a:r>
+              <a:rPr lang="en-US" sz="4000" b="1" dirty="0">
+                <a:solidFill>
+                  <a:srgbClr val="0D203F"/>
+                </a:solidFill>
+                <a:latin typeface="+mn-lt"/>
+                <a:cs typeface="Calibri Light"/>
+              </a:rPr>
+              <a:t>challenges</a:t>
+            </a:r>
+          </a:p>
+        </p:txBody>
+      </p:sp>
+      <p:sp>
+        <p:nvSpPr>
+          <p:cNvPr id="9" name="Content Placeholder 2">
+            <a:extLst>
+              <a:ext uri="{FF2B5EF4-FFF2-40B4-BE49-F238E27FC236}">
+                <a16:creationId xmlns:a16="http://schemas.microsoft.com/office/drawing/2014/main" id="{628DDC8C-D4B6-334B-DAAE-F14F9D367722}"/>
+              </a:ext>
+            </a:extLst>
+          </p:cNvPr>
+          <p:cNvSpPr>
+            <a:spLocks noGrp="1"/>
+          </p:cNvSpPr>
+          <p:nvPr>
+            <p:ph idx="1"/>
+          </p:nvPr>
+        </p:nvSpPr>
+        <p:spPr>
+          <a:xfrm>
+            <a:off x="323850" y="3314700"/>
+            <a:ext cx="11481184" cy="2261152"/>
+          </a:xfrm>
+        </p:spPr>
+        <p:txBody>
+          <a:bodyPr vert="horz" lIns="91440" tIns="45720" rIns="91440" bIns="45720" rtlCol="0" anchor="t">
+            <a:normAutofit/>
+          </a:bodyPr>
+          <a:lstStyle/>
+          <a:p>
+            <a:pPr marL="0" indent="0" algn="ctr">
+              <a:buNone/>
+            </a:pPr>
+            <a:endParaRPr lang="en-US" sz="3200" dirty="0">
+              <a:solidFill>
+                <a:srgbClr val="0D203F"/>
+              </a:solidFill>
+              <a:ea typeface="+mn-lt"/>
+              <a:cs typeface="+mn-lt"/>
+            </a:endParaRPr>
+          </a:p>
+        </p:txBody>
+      </p:sp>
+    </p:spTree>
+    <p:extLst>
+      <p:ext uri="{BB962C8B-B14F-4D97-AF65-F5344CB8AC3E}">
+        <p14:creationId xmlns:p14="http://schemas.microsoft.com/office/powerpoint/2010/main" val="89558452"/>
+      </p:ext>
+    </p:extLst>
+  </p:cSld>
+  <p:clrMapOvr>
+    <a:masterClrMapping/>
+  </p:clrMapOvr>
+  <p:transition spd="med">
+    <p:fade/>
+  </p:transition>
+</p:sld>
+</file>
+
+<file path=ppt/slides/slide23.xml><?xml version="1.0" encoding="utf-8"?>
+<p:sld xmlns:a="http://schemas.openxmlformats.org/drawingml/2006/main" xmlns:r="http://schemas.openxmlformats.org/officeDocument/2006/relationships" xmlns:p="http://schemas.openxmlformats.org/presentationml/2006/main">
+  <p:cSld>
+    <p:bg>
+      <p:bgPr>
+        <a:solidFill>
+          <a:srgbClr val="ECE5EE"/>
+        </a:solidFill>
+        <a:effectLst/>
+      </p:bgPr>
+    </p:bg>
+    <p:spTree>
+      <p:nvGrpSpPr>
+        <p:cNvPr id="1" name=""/>
+        <p:cNvGrpSpPr/>
+        <p:nvPr/>
+      </p:nvGrpSpPr>
+      <p:grpSpPr>
+        <a:xfrm>
+          <a:off x="0" y="0"/>
+          <a:ext cx="0" cy="0"/>
+          <a:chOff x="0" y="0"/>
+          <a:chExt cx="0" cy="0"/>
+        </a:xfrm>
+      </p:grpSpPr>
+      <p:pic>
+        <p:nvPicPr>
+          <p:cNvPr id="15" name="Picture 15" descr="Icon&#10;&#10;Description automatically generated">
+            <a:extLst>
+              <a:ext uri="{FF2B5EF4-FFF2-40B4-BE49-F238E27FC236}">
+                <a16:creationId xmlns:a16="http://schemas.microsoft.com/office/drawing/2014/main" id="{D8D6748C-0585-41A5-8CF9-038CF8AE4A95}"/>
+              </a:ext>
+            </a:extLst>
+          </p:cNvPr>
+          <p:cNvPicPr>
+            <a:picLocks noChangeAspect="1"/>
+          </p:cNvPicPr>
+          <p:nvPr/>
+        </p:nvPicPr>
+        <p:blipFill>
+          <a:blip r:embed="rId2"/>
+          <a:stretch>
+            <a:fillRect/>
+          </a:stretch>
+        </p:blipFill>
+        <p:spPr>
+          <a:xfrm>
+            <a:off x="10767011" y="5454852"/>
+            <a:ext cx="1039620" cy="1039665"/>
+          </a:xfrm>
+          <a:prstGeom prst="rect">
+            <a:avLst/>
+          </a:prstGeom>
+        </p:spPr>
+      </p:pic>
+      <p:sp>
+        <p:nvSpPr>
+          <p:cNvPr id="8" name="Title 1">
+            <a:extLst>
+              <a:ext uri="{FF2B5EF4-FFF2-40B4-BE49-F238E27FC236}">
+                <a16:creationId xmlns:a16="http://schemas.microsoft.com/office/drawing/2014/main" id="{1F5EBDF9-E3E1-9410-7F69-108A2215720D}"/>
+              </a:ext>
+            </a:extLst>
+          </p:cNvPr>
+          <p:cNvSpPr>
+            <a:spLocks noGrp="1"/>
+          </p:cNvSpPr>
+          <p:nvPr>
+            <p:ph type="title"/>
+          </p:nvPr>
+        </p:nvSpPr>
+        <p:spPr>
+          <a:xfrm>
+            <a:off x="323850" y="1946275"/>
+            <a:ext cx="11481184" cy="1325563"/>
+          </a:xfrm>
+        </p:spPr>
+        <p:txBody>
+          <a:bodyPr>
+            <a:normAutofit/>
+          </a:bodyPr>
+          <a:lstStyle/>
+          <a:p>
+            <a:pPr algn="ctr"/>
+            <a:r>
+              <a:rPr lang="en-US" sz="4000" b="1" dirty="0">
+                <a:solidFill>
+                  <a:srgbClr val="0D203F"/>
+                </a:solidFill>
+                <a:latin typeface="+mn-lt"/>
+                <a:cs typeface="Calibri Light"/>
+              </a:rPr>
+              <a:t>challenges</a:t>
+            </a:r>
+          </a:p>
+        </p:txBody>
+      </p:sp>
+      <p:sp>
+        <p:nvSpPr>
+          <p:cNvPr id="9" name="Content Placeholder 2">
+            <a:extLst>
+              <a:ext uri="{FF2B5EF4-FFF2-40B4-BE49-F238E27FC236}">
+                <a16:creationId xmlns:a16="http://schemas.microsoft.com/office/drawing/2014/main" id="{628DDC8C-D4B6-334B-DAAE-F14F9D367722}"/>
+              </a:ext>
+            </a:extLst>
+          </p:cNvPr>
+          <p:cNvSpPr>
+            <a:spLocks noGrp="1"/>
+          </p:cNvSpPr>
+          <p:nvPr>
+            <p:ph idx="1"/>
+          </p:nvPr>
+        </p:nvSpPr>
+        <p:spPr>
+          <a:xfrm>
+            <a:off x="323850" y="3314700"/>
+            <a:ext cx="11481184" cy="2261152"/>
+          </a:xfrm>
+        </p:spPr>
+        <p:txBody>
+          <a:bodyPr vert="horz" lIns="91440" tIns="45720" rIns="91440" bIns="45720" rtlCol="0" anchor="t">
+            <a:normAutofit/>
+          </a:bodyPr>
+          <a:lstStyle/>
+          <a:p>
+            <a:pPr marL="0" indent="0" algn="ctr">
+              <a:buNone/>
+            </a:pPr>
+            <a:r>
+              <a:rPr lang="en-US" sz="3200" dirty="0">
+                <a:solidFill>
+                  <a:srgbClr val="0D203F"/>
+                </a:solidFill>
+                <a:ea typeface="+mn-lt"/>
+                <a:cs typeface="+mn-lt"/>
+              </a:rPr>
+              <a:t>startup time</a:t>
+            </a:r>
+          </a:p>
+        </p:txBody>
+      </p:sp>
+    </p:spTree>
+    <p:extLst>
+      <p:ext uri="{BB962C8B-B14F-4D97-AF65-F5344CB8AC3E}">
+        <p14:creationId xmlns:p14="http://schemas.microsoft.com/office/powerpoint/2010/main" val="803082865"/>
+      </p:ext>
+    </p:extLst>
+  </p:cSld>
+  <p:clrMapOvr>
+    <a:masterClrMapping/>
+  </p:clrMapOvr>
+  <p:transition spd="med">
+    <p:fade/>
+  </p:transition>
+</p:sld>
+</file>
+
+<file path=ppt/slides/slide24.xml><?xml version="1.0" encoding="utf-8"?>
+<p:sld xmlns:a="http://schemas.openxmlformats.org/drawingml/2006/main" xmlns:r="http://schemas.openxmlformats.org/officeDocument/2006/relationships" xmlns:p="http://schemas.openxmlformats.org/presentationml/2006/main">
+  <p:cSld>
+    <p:bg>
+      <p:bgPr>
+        <a:solidFill>
+          <a:srgbClr val="ECE5EE"/>
+        </a:solidFill>
+        <a:effectLst/>
+      </p:bgPr>
+    </p:bg>
+    <p:spTree>
+      <p:nvGrpSpPr>
+        <p:cNvPr id="1" name=""/>
+        <p:cNvGrpSpPr/>
+        <p:nvPr/>
+      </p:nvGrpSpPr>
+      <p:grpSpPr>
+        <a:xfrm>
+          <a:off x="0" y="0"/>
+          <a:ext cx="0" cy="0"/>
+          <a:chOff x="0" y="0"/>
+          <a:chExt cx="0" cy="0"/>
+        </a:xfrm>
+      </p:grpSpPr>
+      <p:pic>
+        <p:nvPicPr>
+          <p:cNvPr id="15" name="Picture 15" descr="Icon&#10;&#10;Description automatically generated">
+            <a:extLst>
+              <a:ext uri="{FF2B5EF4-FFF2-40B4-BE49-F238E27FC236}">
+                <a16:creationId xmlns:a16="http://schemas.microsoft.com/office/drawing/2014/main" id="{D8D6748C-0585-41A5-8CF9-038CF8AE4A95}"/>
+              </a:ext>
+            </a:extLst>
+          </p:cNvPr>
+          <p:cNvPicPr>
+            <a:picLocks noChangeAspect="1"/>
+          </p:cNvPicPr>
+          <p:nvPr/>
+        </p:nvPicPr>
+        <p:blipFill>
+          <a:blip r:embed="rId2"/>
+          <a:stretch>
+            <a:fillRect/>
+          </a:stretch>
+        </p:blipFill>
+        <p:spPr>
+          <a:xfrm>
+            <a:off x="10767011" y="5454852"/>
+            <a:ext cx="1039620" cy="1039665"/>
+          </a:xfrm>
+          <a:prstGeom prst="rect">
+            <a:avLst/>
+          </a:prstGeom>
+        </p:spPr>
+      </p:pic>
+      <p:sp>
+        <p:nvSpPr>
+          <p:cNvPr id="8" name="Title 1">
+            <a:extLst>
+              <a:ext uri="{FF2B5EF4-FFF2-40B4-BE49-F238E27FC236}">
+                <a16:creationId xmlns:a16="http://schemas.microsoft.com/office/drawing/2014/main" id="{1F5EBDF9-E3E1-9410-7F69-108A2215720D}"/>
+              </a:ext>
+            </a:extLst>
+          </p:cNvPr>
+          <p:cNvSpPr>
+            <a:spLocks noGrp="1"/>
+          </p:cNvSpPr>
+          <p:nvPr>
+            <p:ph type="title"/>
+          </p:nvPr>
+        </p:nvSpPr>
+        <p:spPr>
+          <a:xfrm>
+            <a:off x="323850" y="1946275"/>
+            <a:ext cx="11481184" cy="1325563"/>
+          </a:xfrm>
+        </p:spPr>
+        <p:txBody>
+          <a:bodyPr>
+            <a:normAutofit/>
+          </a:bodyPr>
+          <a:lstStyle/>
+          <a:p>
+            <a:pPr algn="ctr"/>
+            <a:r>
+              <a:rPr lang="en-US" sz="4000" b="1" dirty="0">
+                <a:solidFill>
+                  <a:srgbClr val="0D203F"/>
+                </a:solidFill>
+                <a:latin typeface="+mn-lt"/>
+                <a:cs typeface="Calibri Light"/>
+              </a:rPr>
+              <a:t>challenges</a:t>
+            </a:r>
+          </a:p>
+        </p:txBody>
+      </p:sp>
+      <p:sp>
+        <p:nvSpPr>
+          <p:cNvPr id="9" name="Content Placeholder 2">
+            <a:extLst>
+              <a:ext uri="{FF2B5EF4-FFF2-40B4-BE49-F238E27FC236}">
+                <a16:creationId xmlns:a16="http://schemas.microsoft.com/office/drawing/2014/main" id="{628DDC8C-D4B6-334B-DAAE-F14F9D367722}"/>
+              </a:ext>
+            </a:extLst>
+          </p:cNvPr>
+          <p:cNvSpPr>
+            <a:spLocks noGrp="1"/>
+          </p:cNvSpPr>
+          <p:nvPr>
+            <p:ph idx="1"/>
+          </p:nvPr>
+        </p:nvSpPr>
+        <p:spPr>
+          <a:xfrm>
+            <a:off x="323850" y="3314700"/>
+            <a:ext cx="11481184" cy="2261152"/>
+          </a:xfrm>
+        </p:spPr>
+        <p:txBody>
+          <a:bodyPr vert="horz" lIns="91440" tIns="45720" rIns="91440" bIns="45720" rtlCol="0" anchor="t">
+            <a:normAutofit/>
+          </a:bodyPr>
+          <a:lstStyle/>
+          <a:p>
+            <a:pPr marL="0" indent="0" algn="ctr">
+              <a:buNone/>
+            </a:pPr>
+            <a:r>
+              <a:rPr lang="en-US" sz="3200" dirty="0">
+                <a:solidFill>
+                  <a:srgbClr val="0D203F"/>
+                </a:solidFill>
+                <a:ea typeface="+mn-lt"/>
+                <a:cs typeface="+mn-lt"/>
+              </a:rPr>
+              <a:t>stability</a:t>
+            </a:r>
+          </a:p>
+        </p:txBody>
+      </p:sp>
+    </p:spTree>
+    <p:extLst>
+      <p:ext uri="{BB962C8B-B14F-4D97-AF65-F5344CB8AC3E}">
+        <p14:creationId xmlns:p14="http://schemas.microsoft.com/office/powerpoint/2010/main" val="2654143978"/>
+      </p:ext>
+    </p:extLst>
+  </p:cSld>
+  <p:clrMapOvr>
+    <a:masterClrMapping/>
+  </p:clrMapOvr>
+  <p:transition spd="med">
+    <p:fade/>
+  </p:transition>
+</p:sld>
+</file>
+
+<file path=ppt/slides/slide25.xml><?xml version="1.0" encoding="utf-8"?>
+<p:sld xmlns:a="http://schemas.openxmlformats.org/drawingml/2006/main" xmlns:r="http://schemas.openxmlformats.org/officeDocument/2006/relationships" xmlns:p="http://schemas.openxmlformats.org/presentationml/2006/main">
+  <p:cSld>
+    <p:bg>
+      <p:bgPr>
+        <a:solidFill>
+          <a:srgbClr val="ECE5EE"/>
+        </a:solidFill>
+        <a:effectLst/>
+      </p:bgPr>
+    </p:bg>
+    <p:spTree>
+      <p:nvGrpSpPr>
+        <p:cNvPr id="1" name=""/>
+        <p:cNvGrpSpPr/>
+        <p:nvPr/>
+      </p:nvGrpSpPr>
+      <p:grpSpPr>
+        <a:xfrm>
+          <a:off x="0" y="0"/>
+          <a:ext cx="0" cy="0"/>
+          <a:chOff x="0" y="0"/>
+          <a:chExt cx="0" cy="0"/>
+        </a:xfrm>
+      </p:grpSpPr>
+      <p:pic>
+        <p:nvPicPr>
+          <p:cNvPr id="15" name="Picture 15" descr="Icon&#10;&#10;Description automatically generated">
+            <a:extLst>
+              <a:ext uri="{FF2B5EF4-FFF2-40B4-BE49-F238E27FC236}">
+                <a16:creationId xmlns:a16="http://schemas.microsoft.com/office/drawing/2014/main" id="{D8D6748C-0585-41A5-8CF9-038CF8AE4A95}"/>
+              </a:ext>
+            </a:extLst>
+          </p:cNvPr>
+          <p:cNvPicPr>
+            <a:picLocks noChangeAspect="1"/>
+          </p:cNvPicPr>
+          <p:nvPr/>
+        </p:nvPicPr>
+        <p:blipFill>
+          <a:blip r:embed="rId2"/>
+          <a:stretch>
+            <a:fillRect/>
+          </a:stretch>
+        </p:blipFill>
+        <p:spPr>
+          <a:xfrm>
+            <a:off x="10767011" y="5454852"/>
+            <a:ext cx="1039620" cy="1039665"/>
+          </a:xfrm>
+          <a:prstGeom prst="rect">
+            <a:avLst/>
+          </a:prstGeom>
+        </p:spPr>
+      </p:pic>
+      <p:sp>
+        <p:nvSpPr>
+          <p:cNvPr id="8" name="Title 1">
+            <a:extLst>
+              <a:ext uri="{FF2B5EF4-FFF2-40B4-BE49-F238E27FC236}">
+                <a16:creationId xmlns:a16="http://schemas.microsoft.com/office/drawing/2014/main" id="{1F5EBDF9-E3E1-9410-7F69-108A2215720D}"/>
+              </a:ext>
+            </a:extLst>
+          </p:cNvPr>
+          <p:cNvSpPr>
+            <a:spLocks noGrp="1"/>
+          </p:cNvSpPr>
+          <p:nvPr>
+            <p:ph type="title"/>
+          </p:nvPr>
+        </p:nvSpPr>
+        <p:spPr>
+          <a:xfrm>
+            <a:off x="323850" y="1946275"/>
+            <a:ext cx="11481184" cy="1325563"/>
+          </a:xfrm>
+        </p:spPr>
+        <p:txBody>
+          <a:bodyPr>
+            <a:normAutofit/>
+          </a:bodyPr>
+          <a:lstStyle/>
+          <a:p>
+            <a:pPr algn="ctr"/>
+            <a:r>
+              <a:rPr lang="en-US" sz="4000" b="1" dirty="0">
+                <a:solidFill>
+                  <a:srgbClr val="0D203F"/>
+                </a:solidFill>
+                <a:latin typeface="+mn-lt"/>
+                <a:cs typeface="Calibri Light"/>
+              </a:rPr>
+              <a:t>challenges</a:t>
+            </a:r>
+          </a:p>
+        </p:txBody>
+      </p:sp>
+      <p:sp>
+        <p:nvSpPr>
+          <p:cNvPr id="9" name="Content Placeholder 2">
+            <a:extLst>
+              <a:ext uri="{FF2B5EF4-FFF2-40B4-BE49-F238E27FC236}">
+                <a16:creationId xmlns:a16="http://schemas.microsoft.com/office/drawing/2014/main" id="{628DDC8C-D4B6-334B-DAAE-F14F9D367722}"/>
+              </a:ext>
+            </a:extLst>
+          </p:cNvPr>
+          <p:cNvSpPr>
+            <a:spLocks noGrp="1"/>
+          </p:cNvSpPr>
+          <p:nvPr>
+            <p:ph idx="1"/>
+          </p:nvPr>
+        </p:nvSpPr>
+        <p:spPr>
+          <a:xfrm>
+            <a:off x="323850" y="3314700"/>
+            <a:ext cx="11481184" cy="2261152"/>
+          </a:xfrm>
+        </p:spPr>
+        <p:txBody>
+          <a:bodyPr vert="horz" lIns="91440" tIns="45720" rIns="91440" bIns="45720" rtlCol="0" anchor="t">
+            <a:normAutofit/>
+          </a:bodyPr>
+          <a:lstStyle/>
+          <a:p>
+            <a:pPr marL="0" indent="0" algn="ctr">
+              <a:buNone/>
+            </a:pPr>
+            <a:r>
+              <a:rPr lang="en-US" sz="3200" dirty="0">
+                <a:solidFill>
+                  <a:srgbClr val="0D203F"/>
+                </a:solidFill>
+                <a:ea typeface="+mn-lt"/>
+                <a:cs typeface="+mn-lt"/>
+              </a:rPr>
+              <a:t>size</a:t>
+            </a:r>
+          </a:p>
+        </p:txBody>
+      </p:sp>
+    </p:spTree>
+    <p:extLst>
+      <p:ext uri="{BB962C8B-B14F-4D97-AF65-F5344CB8AC3E}">
+        <p14:creationId xmlns:p14="http://schemas.microsoft.com/office/powerpoint/2010/main" val="2411766397"/>
+      </p:ext>
+    </p:extLst>
+  </p:cSld>
+  <p:clrMapOvr>
+    <a:masterClrMapping/>
+  </p:clrMapOvr>
+  <p:transition spd="med">
+    <p:fade/>
+  </p:transition>
+</p:sld>
+</file>
+
+<file path=ppt/slides/slide26.xml><?xml version="1.0" encoding="utf-8"?>
+<p:sld xmlns:a="http://schemas.openxmlformats.org/drawingml/2006/main" xmlns:r="http://schemas.openxmlformats.org/officeDocument/2006/relationships" xmlns:p="http://schemas.openxmlformats.org/presentationml/2006/main">
+  <p:cSld>
+    <p:bg>
+      <p:bgPr>
+        <a:solidFill>
+          <a:srgbClr val="ECE5EE"/>
+        </a:solidFill>
+        <a:effectLst/>
+      </p:bgPr>
+    </p:bg>
+    <p:spTree>
+      <p:nvGrpSpPr>
+        <p:cNvPr id="1" name=""/>
+        <p:cNvGrpSpPr/>
+        <p:nvPr/>
+      </p:nvGrpSpPr>
+      <p:grpSpPr>
+        <a:xfrm>
+          <a:off x="0" y="0"/>
+          <a:ext cx="0" cy="0"/>
+          <a:chOff x="0" y="0"/>
+          <a:chExt cx="0" cy="0"/>
+        </a:xfrm>
+      </p:grpSpPr>
+      <p:pic>
+        <p:nvPicPr>
+          <p:cNvPr id="15" name="Picture 15" descr="Icon&#10;&#10;Description automatically generated">
+            <a:extLst>
+              <a:ext uri="{FF2B5EF4-FFF2-40B4-BE49-F238E27FC236}">
+                <a16:creationId xmlns:a16="http://schemas.microsoft.com/office/drawing/2014/main" id="{D8D6748C-0585-41A5-8CF9-038CF8AE4A95}"/>
+              </a:ext>
+            </a:extLst>
+          </p:cNvPr>
+          <p:cNvPicPr>
+            <a:picLocks noChangeAspect="1"/>
+          </p:cNvPicPr>
+          <p:nvPr/>
+        </p:nvPicPr>
+        <p:blipFill>
+          <a:blip r:embed="rId2"/>
+          <a:stretch>
+            <a:fillRect/>
+          </a:stretch>
+        </p:blipFill>
+        <p:spPr>
+          <a:xfrm>
+            <a:off x="10767011" y="5454852"/>
+            <a:ext cx="1039620" cy="1039665"/>
+          </a:xfrm>
+          <a:prstGeom prst="rect">
+            <a:avLst/>
+          </a:prstGeom>
+        </p:spPr>
+      </p:pic>
+      <p:sp>
+        <p:nvSpPr>
+          <p:cNvPr id="8" name="Title 1">
+            <a:extLst>
+              <a:ext uri="{FF2B5EF4-FFF2-40B4-BE49-F238E27FC236}">
+                <a16:creationId xmlns:a16="http://schemas.microsoft.com/office/drawing/2014/main" id="{1F5EBDF9-E3E1-9410-7F69-108A2215720D}"/>
+              </a:ext>
+            </a:extLst>
+          </p:cNvPr>
+          <p:cNvSpPr>
+            <a:spLocks noGrp="1"/>
+          </p:cNvSpPr>
+          <p:nvPr>
+            <p:ph type="title"/>
+          </p:nvPr>
+        </p:nvSpPr>
+        <p:spPr>
+          <a:xfrm>
+            <a:off x="323850" y="1946275"/>
+            <a:ext cx="11481184" cy="1325563"/>
+          </a:xfrm>
+        </p:spPr>
+        <p:txBody>
+          <a:bodyPr>
+            <a:normAutofit/>
+          </a:bodyPr>
+          <a:lstStyle/>
+          <a:p>
+            <a:pPr algn="ctr"/>
+            <a:r>
+              <a:rPr lang="en-US" sz="4000" b="1" dirty="0">
+                <a:solidFill>
+                  <a:srgbClr val="0D203F"/>
+                </a:solidFill>
+                <a:latin typeface="+mn-lt"/>
+                <a:cs typeface="Calibri Light"/>
+              </a:rPr>
+              <a:t>challenges</a:t>
+            </a:r>
+          </a:p>
+        </p:txBody>
+      </p:sp>
+      <p:sp>
+        <p:nvSpPr>
+          <p:cNvPr id="9" name="Content Placeholder 2">
+            <a:extLst>
+              <a:ext uri="{FF2B5EF4-FFF2-40B4-BE49-F238E27FC236}">
+                <a16:creationId xmlns:a16="http://schemas.microsoft.com/office/drawing/2014/main" id="{628DDC8C-D4B6-334B-DAAE-F14F9D367722}"/>
+              </a:ext>
+            </a:extLst>
+          </p:cNvPr>
+          <p:cNvSpPr>
+            <a:spLocks noGrp="1"/>
+          </p:cNvSpPr>
+          <p:nvPr>
+            <p:ph idx="1"/>
+          </p:nvPr>
+        </p:nvSpPr>
+        <p:spPr>
+          <a:xfrm>
+            <a:off x="323850" y="3314700"/>
+            <a:ext cx="11481184" cy="2261152"/>
+          </a:xfrm>
+        </p:spPr>
+        <p:txBody>
+          <a:bodyPr vert="horz" lIns="91440" tIns="45720" rIns="91440" bIns="45720" rtlCol="0" anchor="t">
+            <a:normAutofit/>
+          </a:bodyPr>
+          <a:lstStyle/>
+          <a:p>
+            <a:pPr marL="0" indent="0" algn="ctr">
+              <a:buNone/>
+            </a:pPr>
+            <a:r>
+              <a:rPr lang="en-US" sz="3200" dirty="0">
+                <a:solidFill>
+                  <a:srgbClr val="0D203F"/>
+                </a:solidFill>
+                <a:ea typeface="+mn-lt"/>
+                <a:cs typeface="+mn-lt"/>
+              </a:rPr>
+              <a:t>oh all right, convenience</a:t>
+            </a:r>
+          </a:p>
+        </p:txBody>
+      </p:sp>
+    </p:spTree>
+    <p:extLst>
+      <p:ext uri="{BB962C8B-B14F-4D97-AF65-F5344CB8AC3E}">
+        <p14:creationId xmlns:p14="http://schemas.microsoft.com/office/powerpoint/2010/main" val="3214208204"/>
+      </p:ext>
+    </p:extLst>
+  </p:cSld>
+  <p:clrMapOvr>
+    <a:masterClrMapping/>
+  </p:clrMapOvr>
+  <p:transition spd="med">
+    <p:fade/>
+  </p:transition>
+</p:sld>
+</file>
+
+<file path=ppt/slides/slide27.xml><?xml version="1.0" encoding="utf-8"?>
+<p:sld xmlns:a="http://schemas.openxmlformats.org/drawingml/2006/main" xmlns:r="http://schemas.openxmlformats.org/officeDocument/2006/relationships" xmlns:p="http://schemas.openxmlformats.org/presentationml/2006/main">
+  <p:cSld>
+    <p:bg>
+      <p:bgPr>
+        <a:solidFill>
+          <a:srgbClr val="ECE5EE"/>
+        </a:solidFill>
+        <a:effectLst/>
+      </p:bgPr>
+    </p:bg>
+    <p:spTree>
+      <p:nvGrpSpPr>
+        <p:cNvPr id="1" name=""/>
+        <p:cNvGrpSpPr/>
+        <p:nvPr/>
+      </p:nvGrpSpPr>
+      <p:grpSpPr>
+        <a:xfrm>
+          <a:off x="0" y="0"/>
+          <a:ext cx="0" cy="0"/>
+          <a:chOff x="0" y="0"/>
+          <a:chExt cx="0" cy="0"/>
+        </a:xfrm>
+      </p:grpSpPr>
+      <p:pic>
+        <p:nvPicPr>
+          <p:cNvPr id="15" name="Picture 15" descr="Icon&#10;&#10;Description automatically generated">
+            <a:extLst>
+              <a:ext uri="{FF2B5EF4-FFF2-40B4-BE49-F238E27FC236}">
+                <a16:creationId xmlns:a16="http://schemas.microsoft.com/office/drawing/2014/main" id="{D8D6748C-0585-41A5-8CF9-038CF8AE4A95}"/>
+              </a:ext>
+            </a:extLst>
+          </p:cNvPr>
+          <p:cNvPicPr>
+            <a:picLocks noChangeAspect="1"/>
+          </p:cNvPicPr>
+          <p:nvPr/>
+        </p:nvPicPr>
+        <p:blipFill>
+          <a:blip r:embed="rId2"/>
+          <a:stretch>
+            <a:fillRect/>
+          </a:stretch>
+        </p:blipFill>
+        <p:spPr>
+          <a:xfrm>
+            <a:off x="10767011" y="5454852"/>
+            <a:ext cx="1039620" cy="1039665"/>
+          </a:xfrm>
+          <a:prstGeom prst="rect">
+            <a:avLst/>
+          </a:prstGeom>
+        </p:spPr>
+      </p:pic>
+      <p:sp>
+        <p:nvSpPr>
+          <p:cNvPr id="8" name="Title 1">
+            <a:extLst>
+              <a:ext uri="{FF2B5EF4-FFF2-40B4-BE49-F238E27FC236}">
+                <a16:creationId xmlns:a16="http://schemas.microsoft.com/office/drawing/2014/main" id="{1F5EBDF9-E3E1-9410-7F69-108A2215720D}"/>
+              </a:ext>
+            </a:extLst>
+          </p:cNvPr>
+          <p:cNvSpPr>
+            <a:spLocks noGrp="1"/>
+          </p:cNvSpPr>
+          <p:nvPr>
+            <p:ph type="title"/>
+          </p:nvPr>
+        </p:nvSpPr>
+        <p:spPr>
+          <a:xfrm>
+            <a:off x="323850" y="1946275"/>
+            <a:ext cx="11481184" cy="1325563"/>
+          </a:xfrm>
+        </p:spPr>
+        <p:txBody>
+          <a:bodyPr>
+            <a:normAutofit/>
+          </a:bodyPr>
+          <a:lstStyle/>
+          <a:p>
+            <a:pPr algn="ctr"/>
+            <a:r>
+              <a:rPr lang="en-US" sz="4000" b="1" dirty="0">
+                <a:solidFill>
+                  <a:srgbClr val="0D203F"/>
+                </a:solidFill>
+                <a:latin typeface="+mn-lt"/>
+                <a:cs typeface="Calibri Light"/>
+              </a:rPr>
+              <a:t>go play</a:t>
+            </a:r>
+          </a:p>
+        </p:txBody>
+      </p:sp>
+      <p:sp>
+        <p:nvSpPr>
+          <p:cNvPr id="9" name="Content Placeholder 2">
+            <a:extLst>
+              <a:ext uri="{FF2B5EF4-FFF2-40B4-BE49-F238E27FC236}">
+                <a16:creationId xmlns:a16="http://schemas.microsoft.com/office/drawing/2014/main" id="{628DDC8C-D4B6-334B-DAAE-F14F9D367722}"/>
+              </a:ext>
+            </a:extLst>
+          </p:cNvPr>
+          <p:cNvSpPr>
+            <a:spLocks noGrp="1"/>
+          </p:cNvSpPr>
+          <p:nvPr>
+            <p:ph idx="1"/>
+          </p:nvPr>
+        </p:nvSpPr>
+        <p:spPr>
+          <a:xfrm>
+            <a:off x="323850" y="3314700"/>
+            <a:ext cx="11481184" cy="2261152"/>
+          </a:xfrm>
+        </p:spPr>
+        <p:txBody>
+          <a:bodyPr vert="horz" lIns="91440" tIns="45720" rIns="91440" bIns="45720" rtlCol="0" anchor="t">
+            <a:normAutofit/>
+          </a:bodyPr>
+          <a:lstStyle/>
+          <a:p>
+            <a:pPr marL="0" indent="0" algn="ctr">
+              <a:buNone/>
+            </a:pPr>
+            <a:r>
+              <a:rPr lang="en-US" sz="3200" dirty="0">
+                <a:solidFill>
+                  <a:srgbClr val="0D203F"/>
+                </a:solidFill>
+                <a:ea typeface="+mn-lt"/>
+                <a:cs typeface="+mn-lt"/>
+              </a:rPr>
+              <a:t>NuGet: </a:t>
+            </a:r>
+            <a:r>
+              <a:rPr lang="en-US" sz="3200" dirty="0" err="1">
+                <a:solidFill>
+                  <a:srgbClr val="0D203F"/>
+                </a:solidFill>
+                <a:ea typeface="+mn-lt"/>
+                <a:cs typeface="+mn-lt"/>
+              </a:rPr>
+              <a:t>Fermyon.Spin.Sdk</a:t>
+            </a:r>
+            <a:endParaRPr lang="en-US" sz="3200" dirty="0">
+              <a:solidFill>
+                <a:srgbClr val="0D203F"/>
+              </a:solidFill>
+              <a:ea typeface="+mn-lt"/>
+              <a:cs typeface="+mn-lt"/>
+            </a:endParaRPr>
+          </a:p>
+        </p:txBody>
+      </p:sp>
+    </p:spTree>
+    <p:extLst>
+      <p:ext uri="{BB962C8B-B14F-4D97-AF65-F5344CB8AC3E}">
+        <p14:creationId xmlns:p14="http://schemas.microsoft.com/office/powerpoint/2010/main" val="3792771893"/>
+      </p:ext>
+    </p:extLst>
+  </p:cSld>
+  <p:clrMapOvr>
+    <a:masterClrMapping/>
+  </p:clrMapOvr>
+  <p:transition spd="med">
+    <p:fade/>
+  </p:transition>
+</p:sld>
+</file>
+
+<file path=ppt/slides/slide28.xml><?xml version="1.0" encoding="utf-8"?>
+<p:sld xmlns:a="http://schemas.openxmlformats.org/drawingml/2006/main" xmlns:r="http://schemas.openxmlformats.org/officeDocument/2006/relationships" xmlns:p="http://schemas.openxmlformats.org/presentationml/2006/main">
+  <p:cSld>
+    <p:bg>
+      <p:bgPr>
+        <a:solidFill>
+          <a:srgbClr val="ECE5EE"/>
+        </a:solidFill>
+        <a:effectLst/>
+      </p:bgPr>
+    </p:bg>
+    <p:spTree>
+      <p:nvGrpSpPr>
+        <p:cNvPr id="1" name=""/>
+        <p:cNvGrpSpPr/>
+        <p:nvPr/>
+      </p:nvGrpSpPr>
+      <p:grpSpPr>
+        <a:xfrm>
+          <a:off x="0" y="0"/>
+          <a:ext cx="0" cy="0"/>
+          <a:chOff x="0" y="0"/>
+          <a:chExt cx="0" cy="0"/>
+        </a:xfrm>
+      </p:grpSpPr>
+      <p:pic>
+        <p:nvPicPr>
+          <p:cNvPr id="15" name="Picture 15" descr="Icon&#10;&#10;Description automatically generated">
+            <a:extLst>
+              <a:ext uri="{FF2B5EF4-FFF2-40B4-BE49-F238E27FC236}">
+                <a16:creationId xmlns:a16="http://schemas.microsoft.com/office/drawing/2014/main" id="{D8D6748C-0585-41A5-8CF9-038CF8AE4A95}"/>
+              </a:ext>
+            </a:extLst>
+          </p:cNvPr>
+          <p:cNvPicPr>
+            <a:picLocks noChangeAspect="1"/>
+          </p:cNvPicPr>
+          <p:nvPr/>
+        </p:nvPicPr>
+        <p:blipFill>
+          <a:blip r:embed="rId2"/>
+          <a:stretch>
+            <a:fillRect/>
+          </a:stretch>
+        </p:blipFill>
+        <p:spPr>
+          <a:xfrm>
+            <a:off x="10767011" y="5454852"/>
+            <a:ext cx="1039620" cy="1039665"/>
+          </a:xfrm>
+          <a:prstGeom prst="rect">
+            <a:avLst/>
+          </a:prstGeom>
+        </p:spPr>
+      </p:pic>
+      <p:sp>
+        <p:nvSpPr>
+          <p:cNvPr id="8" name="Title 1">
+            <a:extLst>
+              <a:ext uri="{FF2B5EF4-FFF2-40B4-BE49-F238E27FC236}">
+                <a16:creationId xmlns:a16="http://schemas.microsoft.com/office/drawing/2014/main" id="{1F5EBDF9-E3E1-9410-7F69-108A2215720D}"/>
+              </a:ext>
+            </a:extLst>
+          </p:cNvPr>
+          <p:cNvSpPr>
+            <a:spLocks noGrp="1"/>
+          </p:cNvSpPr>
+          <p:nvPr>
+            <p:ph type="title"/>
+          </p:nvPr>
+        </p:nvSpPr>
+        <p:spPr>
+          <a:xfrm>
+            <a:off x="323850" y="1946275"/>
+            <a:ext cx="11481184" cy="1325563"/>
+          </a:xfrm>
+        </p:spPr>
+        <p:txBody>
+          <a:bodyPr>
+            <a:normAutofit/>
+          </a:bodyPr>
+          <a:lstStyle/>
+          <a:p>
+            <a:pPr algn="ctr"/>
+            <a:r>
+              <a:rPr lang="en-US" sz="4000" b="1" dirty="0">
+                <a:solidFill>
+                  <a:srgbClr val="0D203F"/>
+                </a:solidFill>
+                <a:latin typeface="+mn-lt"/>
+                <a:cs typeface="Calibri Light"/>
+              </a:rPr>
+              <a:t>go play</a:t>
+            </a:r>
+          </a:p>
+        </p:txBody>
+      </p:sp>
+      <p:sp>
+        <p:nvSpPr>
+          <p:cNvPr id="9" name="Content Placeholder 2">
+            <a:extLst>
+              <a:ext uri="{FF2B5EF4-FFF2-40B4-BE49-F238E27FC236}">
+                <a16:creationId xmlns:a16="http://schemas.microsoft.com/office/drawing/2014/main" id="{628DDC8C-D4B6-334B-DAAE-F14F9D367722}"/>
+              </a:ext>
+            </a:extLst>
+          </p:cNvPr>
+          <p:cNvSpPr>
+            <a:spLocks noGrp="1"/>
+          </p:cNvSpPr>
+          <p:nvPr>
+            <p:ph idx="1"/>
+          </p:nvPr>
+        </p:nvSpPr>
+        <p:spPr>
+          <a:xfrm>
+            <a:off x="323850" y="3314700"/>
+            <a:ext cx="11481184" cy="2261152"/>
+          </a:xfrm>
+        </p:spPr>
+        <p:txBody>
+          <a:bodyPr vert="horz" lIns="91440" tIns="45720" rIns="91440" bIns="45720" rtlCol="0" anchor="t">
+            <a:normAutofit/>
+          </a:bodyPr>
+          <a:lstStyle/>
+          <a:p>
+            <a:pPr marL="0" indent="0" algn="ctr">
+              <a:buNone/>
+            </a:pPr>
+            <a:r>
+              <a:rPr lang="en-US" sz="3200" dirty="0">
+                <a:solidFill>
+                  <a:srgbClr val="0D203F"/>
+                </a:solidFill>
+                <a:ea typeface="+mn-lt"/>
+                <a:cs typeface="+mn-lt"/>
+              </a:rPr>
+              <a:t>more than just </a:t>
+            </a:r>
+            <a:r>
+              <a:rPr lang="en-US" sz="3200" dirty="0" err="1">
+                <a:solidFill>
+                  <a:srgbClr val="0D203F"/>
+                </a:solidFill>
+                <a:ea typeface="+mn-lt"/>
+                <a:cs typeface="+mn-lt"/>
+              </a:rPr>
+              <a:t>.net</a:t>
+            </a:r>
+            <a:endParaRPr lang="en-US" sz="3200" dirty="0">
+              <a:solidFill>
+                <a:srgbClr val="0D203F"/>
+              </a:solidFill>
+              <a:ea typeface="+mn-lt"/>
+              <a:cs typeface="+mn-lt"/>
+            </a:endParaRPr>
+          </a:p>
+        </p:txBody>
+      </p:sp>
+    </p:spTree>
+    <p:extLst>
+      <p:ext uri="{BB962C8B-B14F-4D97-AF65-F5344CB8AC3E}">
+        <p14:creationId xmlns:p14="http://schemas.microsoft.com/office/powerpoint/2010/main" val="1270928165"/>
+      </p:ext>
+    </p:extLst>
+  </p:cSld>
+  <p:clrMapOvr>
+    <a:masterClrMapping/>
+  </p:clrMapOvr>
+  <p:transition spd="med">
+    <p:fade/>
+  </p:transition>
+</p:sld>
+</file>
+
+<file path=ppt/slides/slide29.xml><?xml version="1.0" encoding="utf-8"?>
+<p:sld xmlns:a="http://schemas.openxmlformats.org/drawingml/2006/main" xmlns:r="http://schemas.openxmlformats.org/officeDocument/2006/relationships" xmlns:p="http://schemas.openxmlformats.org/presentationml/2006/main">
+  <p:cSld>
+    <p:bg>
+      <p:bgPr>
+        <a:solidFill>
+          <a:srgbClr val="ECE5EE"/>
+        </a:solidFill>
+        <a:effectLst/>
+      </p:bgPr>
+    </p:bg>
+    <p:spTree>
+      <p:nvGrpSpPr>
+        <p:cNvPr id="1" name=""/>
+        <p:cNvGrpSpPr/>
+        <p:nvPr/>
+      </p:nvGrpSpPr>
+      <p:grpSpPr>
+        <a:xfrm>
+          <a:off x="0" y="0"/>
+          <a:ext cx="0" cy="0"/>
+          <a:chOff x="0" y="0"/>
+          <a:chExt cx="0" cy="0"/>
+        </a:xfrm>
+      </p:grpSpPr>
+      <p:pic>
+        <p:nvPicPr>
+          <p:cNvPr id="7" name="Picture 15" descr="Icon&#10;&#10;Description automatically generated">
+            <a:extLst>
+              <a:ext uri="{FF2B5EF4-FFF2-40B4-BE49-F238E27FC236}">
+                <a16:creationId xmlns:a16="http://schemas.microsoft.com/office/drawing/2014/main" id="{2E17E816-50B0-B06E-F42B-4E02E55CBF7F}"/>
+              </a:ext>
+            </a:extLst>
+          </p:cNvPr>
+          <p:cNvPicPr>
+            <a:picLocks noChangeAspect="1"/>
+          </p:cNvPicPr>
+          <p:nvPr/>
+        </p:nvPicPr>
+        <p:blipFill>
+          <a:blip r:embed="rId2"/>
+          <a:stretch>
+            <a:fillRect/>
+          </a:stretch>
+        </p:blipFill>
+        <p:spPr>
+          <a:xfrm>
+            <a:off x="10767011" y="5454852"/>
+            <a:ext cx="1039620" cy="1039665"/>
+          </a:xfrm>
+          <a:prstGeom prst="rect">
+            <a:avLst/>
+          </a:prstGeom>
+        </p:spPr>
+      </p:pic>
+      <p:sp>
+        <p:nvSpPr>
+          <p:cNvPr id="2" name="Title 1">
+            <a:extLst>
+              <a:ext uri="{FF2B5EF4-FFF2-40B4-BE49-F238E27FC236}">
+                <a16:creationId xmlns:a16="http://schemas.microsoft.com/office/drawing/2014/main" id="{F7C4B072-298F-4A0B-88F9-58043C04C538}"/>
+              </a:ext>
+            </a:extLst>
+          </p:cNvPr>
+          <p:cNvSpPr>
+            <a:spLocks noGrp="1"/>
+          </p:cNvSpPr>
+          <p:nvPr>
+            <p:ph type="title"/>
+          </p:nvPr>
+        </p:nvSpPr>
+        <p:spPr>
+          <a:xfrm>
+            <a:off x="323850" y="365125"/>
+            <a:ext cx="11481184" cy="1325563"/>
+          </a:xfrm>
+        </p:spPr>
+        <p:txBody>
+          <a:bodyPr>
+            <a:normAutofit/>
+          </a:bodyPr>
+          <a:lstStyle/>
+          <a:p>
+            <a:pPr algn="ctr"/>
+            <a:r>
+              <a:rPr lang="en-US" sz="4000" b="1" dirty="0">
+                <a:solidFill>
+                  <a:srgbClr val="0D203F"/>
+                </a:solidFill>
+                <a:latin typeface="+mn-lt"/>
+                <a:cs typeface="Calibri Light"/>
+              </a:rPr>
+              <a:t>thanks!</a:t>
+            </a:r>
+          </a:p>
+        </p:txBody>
+      </p:sp>
+      <p:sp>
+        <p:nvSpPr>
+          <p:cNvPr id="3" name="Content Placeholder 2">
+            <a:extLst>
+              <a:ext uri="{FF2B5EF4-FFF2-40B4-BE49-F238E27FC236}">
+                <a16:creationId xmlns:a16="http://schemas.microsoft.com/office/drawing/2014/main" id="{81C248F1-35F2-41D9-A7BD-E53E926F00C0}"/>
+              </a:ext>
+            </a:extLst>
+          </p:cNvPr>
+          <p:cNvSpPr>
+            <a:spLocks noGrp="1"/>
+          </p:cNvSpPr>
+          <p:nvPr>
+            <p:ph idx="1"/>
+          </p:nvPr>
+        </p:nvSpPr>
+        <p:spPr>
+          <a:xfrm>
+            <a:off x="323850" y="1883603"/>
+            <a:ext cx="11481184" cy="3692249"/>
+          </a:xfrm>
+        </p:spPr>
+        <p:txBody>
+          <a:bodyPr vert="horz" lIns="91440" tIns="45720" rIns="91440" bIns="45720" rtlCol="0" anchor="t">
+            <a:normAutofit/>
+          </a:bodyPr>
+          <a:lstStyle/>
+          <a:p>
+            <a:pPr marL="0" indent="0" algn="ctr">
+              <a:buNone/>
+            </a:pPr>
+            <a:r>
+              <a:rPr lang="en-US" dirty="0">
+                <a:solidFill>
+                  <a:srgbClr val="0D203F"/>
+                </a:solidFill>
+                <a:ea typeface="+mn-lt"/>
+                <a:cs typeface="+mn-lt"/>
+                <a:hlinkClick r:id="rId3"/>
+              </a:rPr>
+              <a:t>https://github.com/itowlson/wasmday22</a:t>
+            </a:r>
+          </a:p>
+          <a:p>
+            <a:pPr marL="0" indent="0" algn="ctr">
+              <a:buNone/>
+            </a:pPr>
+            <a:r>
+              <a:rPr lang="en-US" dirty="0">
+                <a:solidFill>
+                  <a:srgbClr val="0D203F"/>
+                </a:solidFill>
+                <a:ea typeface="+mn-lt"/>
+                <a:cs typeface="+mn-lt"/>
+                <a:hlinkClick r:id="rId3"/>
+              </a:rPr>
+              <a:t>https://github.com/fermyon/spin-dotnet-sdk</a:t>
+            </a:r>
+            <a:endParaRPr lang="en-US" dirty="0">
+              <a:solidFill>
+                <a:srgbClr val="0D203F"/>
+              </a:solidFill>
+              <a:ea typeface="+mn-lt"/>
+              <a:cs typeface="+mn-lt"/>
+            </a:endParaRPr>
+          </a:p>
+          <a:p>
+            <a:pPr marL="0" indent="0" algn="ctr">
+              <a:buNone/>
+            </a:pPr>
+            <a:r>
+              <a:rPr lang="en-US" dirty="0">
+                <a:solidFill>
+                  <a:srgbClr val="0D203F"/>
+                </a:solidFill>
+                <a:ea typeface="+mn-lt"/>
+                <a:cs typeface="+mn-lt"/>
+                <a:hlinkClick r:id="rId4"/>
+              </a:rPr>
+              <a:t>https://github.com/SteveSandersonMS/dotnet-wasi-sdk</a:t>
+            </a:r>
+            <a:endParaRPr lang="en-US" dirty="0">
+              <a:solidFill>
+                <a:srgbClr val="0D203F"/>
+              </a:solidFill>
+              <a:ea typeface="+mn-lt"/>
+              <a:cs typeface="+mn-lt"/>
+            </a:endParaRPr>
+          </a:p>
+          <a:p>
+            <a:pPr marL="0" indent="0" algn="ctr">
+              <a:buNone/>
+            </a:pPr>
+            <a:endParaRPr lang="en-US" dirty="0">
+              <a:solidFill>
+                <a:srgbClr val="0D203F"/>
+              </a:solidFill>
+              <a:ea typeface="+mn-lt"/>
+              <a:cs typeface="+mn-lt"/>
+            </a:endParaRPr>
+          </a:p>
+          <a:p>
+            <a:pPr marL="0" indent="0" algn="ctr">
+              <a:buNone/>
+            </a:pPr>
+            <a:r>
+              <a:rPr lang="en-US" dirty="0">
+                <a:solidFill>
+                  <a:srgbClr val="0D203F"/>
+                </a:solidFill>
+                <a:ea typeface="+mn-lt"/>
+                <a:cs typeface="+mn-lt"/>
+              </a:rPr>
+              <a:t>ivan.towlson@fermyon.com | @ppog_penguin</a:t>
+            </a:r>
+          </a:p>
+          <a:p>
+            <a:pPr marL="0" indent="0" algn="ctr">
+              <a:buNone/>
+            </a:pPr>
+            <a:endParaRPr lang="en-US" dirty="0">
+              <a:solidFill>
+                <a:srgbClr val="0D203F"/>
+              </a:solidFill>
+              <a:ea typeface="+mn-lt"/>
+              <a:cs typeface="+mn-lt"/>
+            </a:endParaRPr>
+          </a:p>
+        </p:txBody>
+      </p:sp>
+    </p:spTree>
+    <p:extLst>
+      <p:ext uri="{BB962C8B-B14F-4D97-AF65-F5344CB8AC3E}">
+        <p14:creationId xmlns:p14="http://schemas.microsoft.com/office/powerpoint/2010/main" val="2055876694"/>
       </p:ext>
     </p:extLst>
   </p:cSld>

</xml_diff>